<commit_message>
Added some to the Project Features.
</commit_message>
<xml_diff>
--- a/docs/expo_poster/ResearchShowcasePoster_EECS_2017.pptx
+++ b/docs/expo_poster/ResearchShowcasePoster_EECS_2017.pptx
@@ -34,7 +34,7 @@
       </p:grpSpPr>
       <p:sp>
         <p:nvSpPr>
-          <p:cNvPr id="38" name="PlaceHolder 1"/>
+          <p:cNvPr id="37" name="PlaceHolder 1"/>
           <p:cNvSpPr>
             <a:spLocks noGrp="1"/>
           </p:cNvSpPr>
@@ -64,7 +64,7 @@
                     <a:srgbClr val="ffffff"/>
                   </a:solidFill>
                 </a:uFill>
-                <a:latin typeface="Nimbus Sans"/>
+                <a:latin typeface="Arial"/>
               </a:rPr>
               <a:t>Click to edit the notes format</a:t>
             </a:r>
@@ -77,14 +77,14 @@
                   <a:srgbClr val="ffffff"/>
                 </a:solidFill>
               </a:uFill>
-              <a:latin typeface="Nimbus Sans"/>
+              <a:latin typeface="Arial"/>
             </a:endParaRPr>
           </a:p>
         </p:txBody>
       </p:sp>
       <p:sp>
         <p:nvSpPr>
-          <p:cNvPr id="39" name="PlaceHolder 2"/>
+          <p:cNvPr id="38" name="PlaceHolder 2"/>
           <p:cNvSpPr>
             <a:spLocks noGrp="1"/>
           </p:cNvSpPr>
@@ -114,9 +114,9 @@
                     <a:srgbClr val="ffffff"/>
                   </a:solidFill>
                 </a:uFill>
-                <a:latin typeface="Nimbus Roman"/>
-              </a:rPr>
-              <a:t>&lt;header&gt;</a:t>
+                <a:latin typeface="Times New Roman"/>
+              </a:rPr>
+              <a:t> </a:t>
             </a:r>
             <a:endParaRPr b="0" lang="en-US" sz="1400" spc="-1" strike="noStrike">
               <a:solidFill>
@@ -127,14 +127,14 @@
                   <a:srgbClr val="ffffff"/>
                 </a:solidFill>
               </a:uFill>
-              <a:latin typeface="Nimbus Roman"/>
+              <a:latin typeface="Times New Roman"/>
             </a:endParaRPr>
           </a:p>
         </p:txBody>
       </p:sp>
       <p:sp>
         <p:nvSpPr>
-          <p:cNvPr id="40" name="PlaceHolder 3"/>
+          <p:cNvPr id="39" name="PlaceHolder 3"/>
           <p:cNvSpPr>
             <a:spLocks noGrp="1"/>
           </p:cNvSpPr>
@@ -165,9 +165,9 @@
                     <a:srgbClr val="ffffff"/>
                   </a:solidFill>
                 </a:uFill>
-                <a:latin typeface="Nimbus Roman"/>
-              </a:rPr>
-              <a:t>&lt;date/time&gt;</a:t>
+                <a:latin typeface="Times New Roman"/>
+              </a:rPr>
+              <a:t> </a:t>
             </a:r>
             <a:endParaRPr b="0" lang="en-US" sz="1400" spc="-1" strike="noStrike">
               <a:solidFill>
@@ -178,14 +178,14 @@
                   <a:srgbClr val="ffffff"/>
                 </a:solidFill>
               </a:uFill>
-              <a:latin typeface="Nimbus Roman"/>
+              <a:latin typeface="Times New Roman"/>
             </a:endParaRPr>
           </a:p>
         </p:txBody>
       </p:sp>
       <p:sp>
         <p:nvSpPr>
-          <p:cNvPr id="41" name="PlaceHolder 4"/>
+          <p:cNvPr id="40" name="PlaceHolder 4"/>
           <p:cNvSpPr>
             <a:spLocks noGrp="1"/>
           </p:cNvSpPr>
@@ -215,9 +215,9 @@
                     <a:srgbClr val="ffffff"/>
                   </a:solidFill>
                 </a:uFill>
-                <a:latin typeface="Nimbus Roman"/>
-              </a:rPr>
-              <a:t>&lt;footer&gt;</a:t>
+                <a:latin typeface="Times New Roman"/>
+              </a:rPr>
+              <a:t> </a:t>
             </a:r>
             <a:endParaRPr b="0" lang="en-US" sz="1400" spc="-1" strike="noStrike">
               <a:solidFill>
@@ -228,14 +228,14 @@
                   <a:srgbClr val="ffffff"/>
                 </a:solidFill>
               </a:uFill>
-              <a:latin typeface="Nimbus Roman"/>
+              <a:latin typeface="Times New Roman"/>
             </a:endParaRPr>
           </a:p>
         </p:txBody>
       </p:sp>
       <p:sp>
         <p:nvSpPr>
-          <p:cNvPr id="42" name="PlaceHolder 5"/>
+          <p:cNvPr id="41" name="PlaceHolder 5"/>
           <p:cNvSpPr>
             <a:spLocks noGrp="1"/>
           </p:cNvSpPr>
@@ -256,7 +256,7 @@
           <a:bodyPr lIns="0" rIns="0" tIns="0" bIns="0" anchor="b"/>
           <a:p>
             <a:pPr algn="r"/>
-            <a:fld id="{758C14A8-8F4A-4385-B1EC-E26469D99C1B}" type="slidenum">
+            <a:fld id="{364CF29C-95F4-401C-ADDA-54B59962B006}" type="slidenum">
               <a:rPr b="0" lang="en-US" sz="1400" spc="-1" strike="noStrike">
                 <a:solidFill>
                   <a:srgbClr val="000000"/>
@@ -266,9 +266,9 @@
                     <a:srgbClr val="ffffff"/>
                   </a:solidFill>
                 </a:uFill>
-                <a:latin typeface="Nimbus Roman"/>
-              </a:rPr>
-              <a:t>&lt;number&gt;</a:t>
+                <a:latin typeface="Times New Roman"/>
+              </a:rPr>
+              <a:t>1</a:t>
             </a:fld>
             <a:endParaRPr b="0" lang="en-US" sz="1400" spc="-1" strike="noStrike">
               <a:solidFill>
@@ -279,7 +279,7 @@
                   <a:srgbClr val="ffffff"/>
                 </a:solidFill>
               </a:uFill>
-              <a:latin typeface="Nimbus Roman"/>
+              <a:latin typeface="Times New Roman"/>
             </a:endParaRPr>
           </a:p>
         </p:txBody>
@@ -309,7 +309,7 @@
       </p:grpSpPr>
       <p:sp>
         <p:nvSpPr>
-          <p:cNvPr id="58" name="PlaceHolder 1"/>
+          <p:cNvPr id="57" name="PlaceHolder 1"/>
           <p:cNvSpPr>
             <a:spLocks noGrp="1"/>
           </p:cNvSpPr>
@@ -320,7 +320,7 @@
         <p:spPr>
           <a:xfrm>
             <a:off x="685800" y="4343400"/>
-            <a:ext cx="5485680" cy="4114080"/>
+            <a:ext cx="5485320" cy="4113720"/>
           </a:xfrm>
           <a:prstGeom prst="rect">
             <a:avLst/>
@@ -338,21 +338,21 @@
                   <a:srgbClr val="ffffff"/>
                 </a:solidFill>
               </a:uFill>
-              <a:latin typeface="Nimbus Sans"/>
+              <a:latin typeface="Arial"/>
             </a:endParaRPr>
           </a:p>
         </p:txBody>
       </p:sp>
       <p:sp>
         <p:nvSpPr>
-          <p:cNvPr id="59" name="CustomShape 2"/>
+          <p:cNvPr id="58" name="CustomShape 2"/>
           <p:cNvSpPr/>
           <p:nvPr/>
         </p:nvSpPr>
         <p:spPr>
           <a:xfrm>
             <a:off x="3884760" y="8685360"/>
-            <a:ext cx="2971080" cy="456480"/>
+            <a:ext cx="2970720" cy="456120"/>
           </a:xfrm>
           <a:prstGeom prst="rect">
             <a:avLst/>
@@ -376,7 +376,7 @@
                 <a:spcPct val="100000"/>
               </a:lnSpc>
             </a:pPr>
-            <a:fld id="{2D08EB97-37A3-4B93-821F-5B51EC61B512}" type="slidenum">
+            <a:fld id="{561CC6EF-1F79-4EF8-9AB6-A2AEE090934D}" type="slidenum">
               <a:rPr b="0" lang="en-US" sz="1200" spc="-1" strike="noStrike">
                 <a:solidFill>
                   <a:srgbClr val="000000"/>
@@ -400,7 +400,7 @@
                   <a:srgbClr val="ffffff"/>
                 </a:solidFill>
               </a:uFill>
-              <a:latin typeface="Nimbus Sans"/>
+              <a:latin typeface="Arial"/>
             </a:endParaRPr>
           </a:p>
         </p:txBody>
@@ -451,7 +451,7 @@
       </p:grpSpPr>
       <p:sp>
         <p:nvSpPr>
-          <p:cNvPr id="23" name="PlaceHolder 1"/>
+          <p:cNvPr id="24" name="PlaceHolder 1"/>
           <p:cNvSpPr>
             <a:spLocks noGrp="1"/>
           </p:cNvSpPr>
@@ -462,7 +462,7 @@
         <p:spPr>
           <a:xfrm>
             <a:off x="3154680" y="10083960"/>
-            <a:ext cx="35752320" cy="6957360"/>
+            <a:ext cx="35751960" cy="6957000"/>
           </a:xfrm>
           <a:prstGeom prst="rect">
             <a:avLst/>
@@ -481,14 +481,14 @@
                   <a:srgbClr val="ffffff"/>
                 </a:solidFill>
               </a:uFill>
-              <a:latin typeface="Nimbus Sans"/>
+              <a:latin typeface="Arial"/>
             </a:endParaRPr>
           </a:p>
         </p:txBody>
       </p:sp>
       <p:sp>
         <p:nvSpPr>
-          <p:cNvPr id="24" name="PlaceHolder 2"/>
+          <p:cNvPr id="25" name="PlaceHolder 2"/>
           <p:cNvSpPr>
             <a:spLocks noGrp="1"/>
           </p:cNvSpPr>
@@ -499,7 +499,7 @@
         <p:spPr>
           <a:xfrm>
             <a:off x="2103120" y="7595640"/>
-            <a:ext cx="37855800" cy="8980200"/>
+            <a:ext cx="37855440" cy="8980200"/>
           </a:xfrm>
           <a:prstGeom prst="rect">
             <a:avLst/>
@@ -517,14 +517,14 @@
                   <a:srgbClr val="ffffff"/>
                 </a:solidFill>
               </a:uFill>
-              <a:latin typeface="Nimbus Sans"/>
+              <a:latin typeface="Arial"/>
             </a:endParaRPr>
           </a:p>
         </p:txBody>
       </p:sp>
       <p:sp>
         <p:nvSpPr>
-          <p:cNvPr id="25" name="PlaceHolder 3"/>
+          <p:cNvPr id="26" name="PlaceHolder 3"/>
           <p:cNvSpPr>
             <a:spLocks noGrp="1"/>
           </p:cNvSpPr>
@@ -535,7 +535,7 @@
         <p:spPr>
           <a:xfrm>
             <a:off x="2103120" y="17429400"/>
-            <a:ext cx="37855800" cy="8980200"/>
+            <a:ext cx="37855440" cy="8980200"/>
           </a:xfrm>
           <a:prstGeom prst="rect">
             <a:avLst/>
@@ -553,7 +553,7 @@
                   <a:srgbClr val="ffffff"/>
                 </a:solidFill>
               </a:uFill>
-              <a:latin typeface="Nimbus Sans"/>
+              <a:latin typeface="Arial"/>
             </a:endParaRPr>
           </a:p>
         </p:txBody>
@@ -582,7 +582,7 @@
       </p:grpSpPr>
       <p:sp>
         <p:nvSpPr>
-          <p:cNvPr id="26" name="PlaceHolder 1"/>
+          <p:cNvPr id="27" name="PlaceHolder 1"/>
           <p:cNvSpPr>
             <a:spLocks noGrp="1"/>
           </p:cNvSpPr>
@@ -593,7 +593,7 @@
         <p:spPr>
           <a:xfrm>
             <a:off x="3154680" y="10083960"/>
-            <a:ext cx="35752320" cy="6957360"/>
+            <a:ext cx="35751960" cy="6957000"/>
           </a:xfrm>
           <a:prstGeom prst="rect">
             <a:avLst/>
@@ -612,14 +612,14 @@
                   <a:srgbClr val="ffffff"/>
                 </a:solidFill>
               </a:uFill>
-              <a:latin typeface="Nimbus Sans"/>
+              <a:latin typeface="Arial"/>
             </a:endParaRPr>
           </a:p>
         </p:txBody>
       </p:sp>
       <p:sp>
         <p:nvSpPr>
-          <p:cNvPr id="27" name="PlaceHolder 2"/>
+          <p:cNvPr id="28" name="PlaceHolder 2"/>
           <p:cNvSpPr>
             <a:spLocks noGrp="1"/>
           </p:cNvSpPr>
@@ -648,14 +648,14 @@
                   <a:srgbClr val="ffffff"/>
                 </a:solidFill>
               </a:uFill>
-              <a:latin typeface="Nimbus Sans"/>
+              <a:latin typeface="Arial"/>
             </a:endParaRPr>
           </a:p>
         </p:txBody>
       </p:sp>
       <p:sp>
         <p:nvSpPr>
-          <p:cNvPr id="28" name="PlaceHolder 3"/>
+          <p:cNvPr id="29" name="PlaceHolder 3"/>
           <p:cNvSpPr>
             <a:spLocks noGrp="1"/>
           </p:cNvSpPr>
@@ -684,14 +684,14 @@
                   <a:srgbClr val="ffffff"/>
                 </a:solidFill>
               </a:uFill>
-              <a:latin typeface="Nimbus Sans"/>
+              <a:latin typeface="Arial"/>
             </a:endParaRPr>
           </a:p>
         </p:txBody>
       </p:sp>
       <p:sp>
         <p:nvSpPr>
-          <p:cNvPr id="29" name="PlaceHolder 4"/>
+          <p:cNvPr id="30" name="PlaceHolder 4"/>
           <p:cNvSpPr>
             <a:spLocks noGrp="1"/>
           </p:cNvSpPr>
@@ -720,14 +720,14 @@
                   <a:srgbClr val="ffffff"/>
                 </a:solidFill>
               </a:uFill>
-              <a:latin typeface="Nimbus Sans"/>
+              <a:latin typeface="Arial"/>
             </a:endParaRPr>
           </a:p>
         </p:txBody>
       </p:sp>
       <p:sp>
         <p:nvSpPr>
-          <p:cNvPr id="30" name="PlaceHolder 5"/>
+          <p:cNvPr id="31" name="PlaceHolder 5"/>
           <p:cNvSpPr>
             <a:spLocks noGrp="1"/>
           </p:cNvSpPr>
@@ -756,7 +756,7 @@
                   <a:srgbClr val="ffffff"/>
                 </a:solidFill>
               </a:uFill>
-              <a:latin typeface="Nimbus Sans"/>
+              <a:latin typeface="Arial"/>
             </a:endParaRPr>
           </a:p>
         </p:txBody>
@@ -785,7 +785,7 @@
       </p:grpSpPr>
       <p:sp>
         <p:nvSpPr>
-          <p:cNvPr id="31" name="PlaceHolder 1"/>
+          <p:cNvPr id="32" name="PlaceHolder 1"/>
           <p:cNvSpPr>
             <a:spLocks noGrp="1"/>
           </p:cNvSpPr>
@@ -796,7 +796,7 @@
         <p:spPr>
           <a:xfrm>
             <a:off x="3154680" y="10083960"/>
-            <a:ext cx="35752320" cy="6957360"/>
+            <a:ext cx="35751960" cy="6957000"/>
           </a:xfrm>
           <a:prstGeom prst="rect">
             <a:avLst/>
@@ -815,14 +815,14 @@
                   <a:srgbClr val="ffffff"/>
                 </a:solidFill>
               </a:uFill>
-              <a:latin typeface="Nimbus Sans"/>
+              <a:latin typeface="Arial"/>
             </a:endParaRPr>
           </a:p>
         </p:txBody>
       </p:sp>
       <p:sp>
         <p:nvSpPr>
-          <p:cNvPr id="32" name="PlaceHolder 2"/>
+          <p:cNvPr id="33" name="PlaceHolder 2"/>
           <p:cNvSpPr>
             <a:spLocks noGrp="1"/>
           </p:cNvSpPr>
@@ -833,7 +833,7 @@
         <p:spPr>
           <a:xfrm>
             <a:off x="2103120" y="7595640"/>
-            <a:ext cx="12189240" cy="8980200"/>
+            <a:ext cx="37855440" cy="18826560"/>
           </a:xfrm>
           <a:prstGeom prst="rect">
             <a:avLst/>
@@ -851,14 +851,14 @@
                   <a:srgbClr val="ffffff"/>
                 </a:solidFill>
               </a:uFill>
-              <a:latin typeface="Nimbus Sans"/>
+              <a:latin typeface="Arial"/>
             </a:endParaRPr>
           </a:p>
         </p:txBody>
       </p:sp>
       <p:sp>
         <p:nvSpPr>
-          <p:cNvPr id="33" name="PlaceHolder 3"/>
+          <p:cNvPr id="34" name="PlaceHolder 3"/>
           <p:cNvSpPr>
             <a:spLocks noGrp="1"/>
           </p:cNvSpPr>
@@ -868,8 +868,8 @@
         </p:nvSpPr>
         <p:spPr>
           <a:xfrm>
-            <a:off x="14902200" y="7595640"/>
-            <a:ext cx="12189240" cy="8980200"/>
+            <a:off x="2103120" y="7595640"/>
+            <a:ext cx="37855440" cy="18826560"/>
           </a:xfrm>
           <a:prstGeom prst="rect">
             <a:avLst/>
@@ -887,155 +887,57 @@
                   <a:srgbClr val="ffffff"/>
                 </a:solidFill>
               </a:uFill>
-              <a:latin typeface="Nimbus Sans"/>
+              <a:latin typeface="Arial"/>
             </a:endParaRPr>
           </a:p>
         </p:txBody>
       </p:sp>
-      <p:sp>
-        <p:nvSpPr>
-          <p:cNvPr id="34" name="PlaceHolder 4"/>
-          <p:cNvSpPr>
-            <a:spLocks noGrp="1"/>
-          </p:cNvSpPr>
-          <p:nvPr>
-            <p:ph type="body"/>
-          </p:nvPr>
-        </p:nvSpPr>
-        <p:spPr>
-          <a:xfrm>
-            <a:off x="27701280" y="7595640"/>
-            <a:ext cx="12189240" cy="8980200"/>
-          </a:xfrm>
-          <a:prstGeom prst="rect">
-            <a:avLst/>
-          </a:prstGeom>
-        </p:spPr>
-        <p:txBody>
-          <a:bodyPr lIns="0" rIns="0" tIns="0" bIns="0"/>
-          <a:p>
-            <a:endParaRPr b="0" lang="en-US" sz="3200" spc="-1" strike="noStrike">
-              <a:solidFill>
-                <a:srgbClr val="000000"/>
-              </a:solidFill>
-              <a:uFill>
-                <a:solidFill>
-                  <a:srgbClr val="ffffff"/>
-                </a:solidFill>
-              </a:uFill>
-              <a:latin typeface="Nimbus Sans"/>
-            </a:endParaRPr>
-          </a:p>
-        </p:txBody>
-      </p:sp>
-      <p:sp>
-        <p:nvSpPr>
-          <p:cNvPr id="35" name="PlaceHolder 5"/>
-          <p:cNvSpPr>
-            <a:spLocks noGrp="1"/>
-          </p:cNvSpPr>
-          <p:nvPr>
-            <p:ph type="body"/>
-          </p:nvPr>
-        </p:nvSpPr>
-        <p:spPr>
-          <a:xfrm>
-            <a:off x="27701280" y="17429400"/>
-            <a:ext cx="12189240" cy="8980200"/>
-          </a:xfrm>
-          <a:prstGeom prst="rect">
-            <a:avLst/>
-          </a:prstGeom>
-        </p:spPr>
-        <p:txBody>
-          <a:bodyPr lIns="0" rIns="0" tIns="0" bIns="0"/>
-          <a:p>
-            <a:endParaRPr b="0" lang="en-US" sz="3200" spc="-1" strike="noStrike">
-              <a:solidFill>
-                <a:srgbClr val="000000"/>
-              </a:solidFill>
-              <a:uFill>
-                <a:solidFill>
-                  <a:srgbClr val="ffffff"/>
-                </a:solidFill>
-              </a:uFill>
-              <a:latin typeface="Nimbus Sans"/>
-            </a:endParaRPr>
-          </a:p>
-        </p:txBody>
-      </p:sp>
-      <p:sp>
-        <p:nvSpPr>
-          <p:cNvPr id="36" name="PlaceHolder 6"/>
-          <p:cNvSpPr>
-            <a:spLocks noGrp="1"/>
-          </p:cNvSpPr>
-          <p:nvPr>
-            <p:ph type="body"/>
-          </p:nvPr>
-        </p:nvSpPr>
-        <p:spPr>
-          <a:xfrm>
-            <a:off x="14902200" y="17429400"/>
-            <a:ext cx="12189240" cy="8980200"/>
-          </a:xfrm>
-          <a:prstGeom prst="rect">
-            <a:avLst/>
-          </a:prstGeom>
-        </p:spPr>
-        <p:txBody>
-          <a:bodyPr lIns="0" rIns="0" tIns="0" bIns="0"/>
-          <a:p>
-            <a:endParaRPr b="0" lang="en-US" sz="3200" spc="-1" strike="noStrike">
-              <a:solidFill>
-                <a:srgbClr val="000000"/>
-              </a:solidFill>
-              <a:uFill>
-                <a:solidFill>
-                  <a:srgbClr val="ffffff"/>
-                </a:solidFill>
-              </a:uFill>
-              <a:latin typeface="Nimbus Sans"/>
-            </a:endParaRPr>
-          </a:p>
-        </p:txBody>
-      </p:sp>
-      <p:sp>
-        <p:nvSpPr>
-          <p:cNvPr id="37" name="PlaceHolder 7"/>
-          <p:cNvSpPr>
-            <a:spLocks noGrp="1"/>
-          </p:cNvSpPr>
-          <p:nvPr>
-            <p:ph type="body"/>
-          </p:nvPr>
-        </p:nvSpPr>
-        <p:spPr>
-          <a:xfrm>
-            <a:off x="2103120" y="17429400"/>
-            <a:ext cx="12189240" cy="8980200"/>
-          </a:xfrm>
-          <a:prstGeom prst="rect">
-            <a:avLst/>
-          </a:prstGeom>
-        </p:spPr>
-        <p:txBody>
-          <a:bodyPr lIns="0" rIns="0" tIns="0" bIns="0"/>
-          <a:p>
-            <a:endParaRPr b="0" lang="en-US" sz="3200" spc="-1" strike="noStrike">
-              <a:solidFill>
-                <a:srgbClr val="000000"/>
-              </a:solidFill>
-              <a:uFill>
-                <a:solidFill>
-                  <a:srgbClr val="ffffff"/>
-                </a:solidFill>
-              </a:uFill>
-              <a:latin typeface="Nimbus Sans"/>
-            </a:endParaRPr>
-          </a:p>
-        </p:txBody>
-      </p:sp>
+      <p:pic>
+        <p:nvPicPr>
+          <p:cNvPr id="35" name="" descr=""/>
+          <p:cNvPicPr/>
+          <p:nvPr/>
+        </p:nvPicPr>
+        <p:blipFill>
+          <a:blip r:embed="rId2"/>
+          <a:stretch/>
+        </p:blipFill>
+        <p:spPr>
+          <a:xfrm>
+            <a:off x="9232920" y="7595640"/>
+            <a:ext cx="23595840" cy="18826560"/>
+          </a:xfrm>
+          <a:prstGeom prst="rect">
+            <a:avLst/>
+          </a:prstGeom>
+          <a:ln>
+            <a:noFill/>
+          </a:ln>
+        </p:spPr>
+      </p:pic>
+      <p:pic>
+        <p:nvPicPr>
+          <p:cNvPr id="36" name="" descr=""/>
+          <p:cNvPicPr/>
+          <p:nvPr/>
+        </p:nvPicPr>
+        <p:blipFill>
+          <a:blip r:embed="rId3"/>
+          <a:stretch/>
+        </p:blipFill>
+        <p:spPr>
+          <a:xfrm>
+            <a:off x="9232920" y="7595640"/>
+            <a:ext cx="23595840" cy="18826560"/>
+          </a:xfrm>
+          <a:prstGeom prst="rect">
+            <a:avLst/>
+          </a:prstGeom>
+          <a:ln>
+            <a:noFill/>
+          </a:ln>
+        </p:spPr>
+      </p:pic>
     </p:spTree>
   </p:cSld>
 </p:sldLayout>
@@ -1060,7 +962,7 @@
       </p:grpSpPr>
       <p:sp>
         <p:nvSpPr>
-          <p:cNvPr id="2" name="PlaceHolder 1"/>
+          <p:cNvPr id="3" name="PlaceHolder 1"/>
           <p:cNvSpPr>
             <a:spLocks noGrp="1"/>
           </p:cNvSpPr>
@@ -1071,7 +973,7 @@
         <p:spPr>
           <a:xfrm>
             <a:off x="3154680" y="10083960"/>
-            <a:ext cx="35752320" cy="6957360"/>
+            <a:ext cx="35751960" cy="6957000"/>
           </a:xfrm>
           <a:prstGeom prst="rect">
             <a:avLst/>
@@ -1090,14 +992,14 @@
                   <a:srgbClr val="ffffff"/>
                 </a:solidFill>
               </a:uFill>
-              <a:latin typeface="Nimbus Sans"/>
+              <a:latin typeface="Arial"/>
             </a:endParaRPr>
           </a:p>
         </p:txBody>
       </p:sp>
       <p:sp>
         <p:nvSpPr>
-          <p:cNvPr id="3" name="PlaceHolder 2"/>
+          <p:cNvPr id="4" name="PlaceHolder 2"/>
           <p:cNvSpPr>
             <a:spLocks noGrp="1"/>
           </p:cNvSpPr>
@@ -1108,7 +1010,7 @@
         <p:spPr>
           <a:xfrm>
             <a:off x="2103120" y="7595640"/>
-            <a:ext cx="37855800" cy="18826920"/>
+            <a:ext cx="37855440" cy="18826560"/>
           </a:xfrm>
           <a:prstGeom prst="rect">
             <a:avLst/>
@@ -1127,7 +1029,7 @@
                   <a:srgbClr val="ffffff"/>
                 </a:solidFill>
               </a:uFill>
-              <a:latin typeface="Nimbus Sans"/>
+              <a:latin typeface="Arial"/>
             </a:endParaRPr>
           </a:p>
         </p:txBody>
@@ -1156,7 +1058,7 @@
       </p:grpSpPr>
       <p:sp>
         <p:nvSpPr>
-          <p:cNvPr id="4" name="PlaceHolder 1"/>
+          <p:cNvPr id="5" name="PlaceHolder 1"/>
           <p:cNvSpPr>
             <a:spLocks noGrp="1"/>
           </p:cNvSpPr>
@@ -1167,7 +1069,7 @@
         <p:spPr>
           <a:xfrm>
             <a:off x="3154680" y="10083960"/>
-            <a:ext cx="35752320" cy="6957360"/>
+            <a:ext cx="35751960" cy="6957000"/>
           </a:xfrm>
           <a:prstGeom prst="rect">
             <a:avLst/>
@@ -1186,14 +1088,14 @@
                   <a:srgbClr val="ffffff"/>
                 </a:solidFill>
               </a:uFill>
-              <a:latin typeface="Nimbus Sans"/>
+              <a:latin typeface="Arial"/>
             </a:endParaRPr>
           </a:p>
         </p:txBody>
       </p:sp>
       <p:sp>
         <p:nvSpPr>
-          <p:cNvPr id="5" name="PlaceHolder 2"/>
+          <p:cNvPr id="6" name="PlaceHolder 2"/>
           <p:cNvSpPr>
             <a:spLocks noGrp="1"/>
           </p:cNvSpPr>
@@ -1204,7 +1106,7 @@
         <p:spPr>
           <a:xfrm>
             <a:off x="2103120" y="7595640"/>
-            <a:ext cx="37855800" cy="18826920"/>
+            <a:ext cx="37855440" cy="18826560"/>
           </a:xfrm>
           <a:prstGeom prst="rect">
             <a:avLst/>
@@ -1222,7 +1124,7 @@
                   <a:srgbClr val="ffffff"/>
                 </a:solidFill>
               </a:uFill>
-              <a:latin typeface="Nimbus Sans"/>
+              <a:latin typeface="Arial"/>
             </a:endParaRPr>
           </a:p>
         </p:txBody>
@@ -1251,7 +1153,7 @@
       </p:grpSpPr>
       <p:sp>
         <p:nvSpPr>
-          <p:cNvPr id="6" name="PlaceHolder 1"/>
+          <p:cNvPr id="7" name="PlaceHolder 1"/>
           <p:cNvSpPr>
             <a:spLocks noGrp="1"/>
           </p:cNvSpPr>
@@ -1262,7 +1164,7 @@
         <p:spPr>
           <a:xfrm>
             <a:off x="3154680" y="10083960"/>
-            <a:ext cx="35752320" cy="6957360"/>
+            <a:ext cx="35751960" cy="6957000"/>
           </a:xfrm>
           <a:prstGeom prst="rect">
             <a:avLst/>
@@ -1281,14 +1183,14 @@
                   <a:srgbClr val="ffffff"/>
                 </a:solidFill>
               </a:uFill>
-              <a:latin typeface="Nimbus Sans"/>
+              <a:latin typeface="Arial"/>
             </a:endParaRPr>
           </a:p>
         </p:txBody>
       </p:sp>
       <p:sp>
         <p:nvSpPr>
-          <p:cNvPr id="7" name="PlaceHolder 2"/>
+          <p:cNvPr id="8" name="PlaceHolder 2"/>
           <p:cNvSpPr>
             <a:spLocks noGrp="1"/>
           </p:cNvSpPr>
@@ -1299,7 +1201,7 @@
         <p:spPr>
           <a:xfrm>
             <a:off x="2103120" y="7595640"/>
-            <a:ext cx="18473400" cy="18826920"/>
+            <a:ext cx="18473400" cy="18826560"/>
           </a:xfrm>
           <a:prstGeom prst="rect">
             <a:avLst/>
@@ -1317,14 +1219,14 @@
                   <a:srgbClr val="ffffff"/>
                 </a:solidFill>
               </a:uFill>
-              <a:latin typeface="Nimbus Sans"/>
+              <a:latin typeface="Arial"/>
             </a:endParaRPr>
           </a:p>
         </p:txBody>
       </p:sp>
       <p:sp>
         <p:nvSpPr>
-          <p:cNvPr id="8" name="PlaceHolder 3"/>
+          <p:cNvPr id="9" name="PlaceHolder 3"/>
           <p:cNvSpPr>
             <a:spLocks noGrp="1"/>
           </p:cNvSpPr>
@@ -1335,7 +1237,7 @@
         <p:spPr>
           <a:xfrm>
             <a:off x="21500640" y="7595640"/>
-            <a:ext cx="18473400" cy="18826920"/>
+            <a:ext cx="18473400" cy="18826560"/>
           </a:xfrm>
           <a:prstGeom prst="rect">
             <a:avLst/>
@@ -1353,7 +1255,7 @@
                   <a:srgbClr val="ffffff"/>
                 </a:solidFill>
               </a:uFill>
-              <a:latin typeface="Nimbus Sans"/>
+              <a:latin typeface="Arial"/>
             </a:endParaRPr>
           </a:p>
         </p:txBody>
@@ -1382,7 +1284,7 @@
       </p:grpSpPr>
       <p:sp>
         <p:nvSpPr>
-          <p:cNvPr id="9" name="PlaceHolder 1"/>
+          <p:cNvPr id="10" name="PlaceHolder 1"/>
           <p:cNvSpPr>
             <a:spLocks noGrp="1"/>
           </p:cNvSpPr>
@@ -1393,7 +1295,7 @@
         <p:spPr>
           <a:xfrm>
             <a:off x="3154680" y="10083960"/>
-            <a:ext cx="35752320" cy="6957360"/>
+            <a:ext cx="35751960" cy="6957000"/>
           </a:xfrm>
           <a:prstGeom prst="rect">
             <a:avLst/>
@@ -1412,7 +1314,7 @@
                   <a:srgbClr val="ffffff"/>
                 </a:solidFill>
               </a:uFill>
-              <a:latin typeface="Nimbus Sans"/>
+              <a:latin typeface="Arial"/>
             </a:endParaRPr>
           </a:p>
         </p:txBody>
@@ -1441,7 +1343,7 @@
       </p:grpSpPr>
       <p:sp>
         <p:nvSpPr>
-          <p:cNvPr id="10" name="PlaceHolder 1"/>
+          <p:cNvPr id="11" name="PlaceHolder 1"/>
           <p:cNvSpPr>
             <a:spLocks noGrp="1"/>
           </p:cNvSpPr>
@@ -1452,7 +1354,7 @@
         <p:spPr>
           <a:xfrm>
             <a:off x="3154680" y="10083960"/>
-            <a:ext cx="35752320" cy="32251320"/>
+            <a:ext cx="35751960" cy="32249880"/>
           </a:xfrm>
           <a:prstGeom prst="rect">
             <a:avLst/>
@@ -1471,7 +1373,7 @@
                   <a:srgbClr val="ffffff"/>
                 </a:solidFill>
               </a:uFill>
-              <a:latin typeface="Nimbus Sans"/>
+              <a:latin typeface="Arial"/>
             </a:endParaRPr>
           </a:p>
         </p:txBody>
@@ -1500,7 +1402,7 @@
       </p:grpSpPr>
       <p:sp>
         <p:nvSpPr>
-          <p:cNvPr id="11" name="PlaceHolder 1"/>
+          <p:cNvPr id="12" name="PlaceHolder 1"/>
           <p:cNvSpPr>
             <a:spLocks noGrp="1"/>
           </p:cNvSpPr>
@@ -1511,7 +1413,7 @@
         <p:spPr>
           <a:xfrm>
             <a:off x="3154680" y="10083960"/>
-            <a:ext cx="35752320" cy="6957360"/>
+            <a:ext cx="35751960" cy="6957000"/>
           </a:xfrm>
           <a:prstGeom prst="rect">
             <a:avLst/>
@@ -1530,14 +1432,14 @@
                   <a:srgbClr val="ffffff"/>
                 </a:solidFill>
               </a:uFill>
-              <a:latin typeface="Nimbus Sans"/>
+              <a:latin typeface="Arial"/>
             </a:endParaRPr>
           </a:p>
         </p:txBody>
       </p:sp>
       <p:sp>
         <p:nvSpPr>
-          <p:cNvPr id="12" name="PlaceHolder 2"/>
+          <p:cNvPr id="13" name="PlaceHolder 2"/>
           <p:cNvSpPr>
             <a:spLocks noGrp="1"/>
           </p:cNvSpPr>
@@ -1566,14 +1468,14 @@
                   <a:srgbClr val="ffffff"/>
                 </a:solidFill>
               </a:uFill>
-              <a:latin typeface="Nimbus Sans"/>
+              <a:latin typeface="Arial"/>
             </a:endParaRPr>
           </a:p>
         </p:txBody>
       </p:sp>
       <p:sp>
         <p:nvSpPr>
-          <p:cNvPr id="13" name="PlaceHolder 3"/>
+          <p:cNvPr id="14" name="PlaceHolder 3"/>
           <p:cNvSpPr>
             <a:spLocks noGrp="1"/>
           </p:cNvSpPr>
@@ -1602,14 +1504,14 @@
                   <a:srgbClr val="ffffff"/>
                 </a:solidFill>
               </a:uFill>
-              <a:latin typeface="Nimbus Sans"/>
+              <a:latin typeface="Arial"/>
             </a:endParaRPr>
           </a:p>
         </p:txBody>
       </p:sp>
       <p:sp>
         <p:nvSpPr>
-          <p:cNvPr id="14" name="PlaceHolder 4"/>
+          <p:cNvPr id="15" name="PlaceHolder 4"/>
           <p:cNvSpPr>
             <a:spLocks noGrp="1"/>
           </p:cNvSpPr>
@@ -1620,7 +1522,7 @@
         <p:spPr>
           <a:xfrm>
             <a:off x="21500640" y="7595640"/>
-            <a:ext cx="18473400" cy="18826920"/>
+            <a:ext cx="18473400" cy="18826560"/>
           </a:xfrm>
           <a:prstGeom prst="rect">
             <a:avLst/>
@@ -1638,7 +1540,7 @@
                   <a:srgbClr val="ffffff"/>
                 </a:solidFill>
               </a:uFill>
-              <a:latin typeface="Nimbus Sans"/>
+              <a:latin typeface="Arial"/>
             </a:endParaRPr>
           </a:p>
         </p:txBody>
@@ -1667,7 +1569,7 @@
       </p:grpSpPr>
       <p:sp>
         <p:nvSpPr>
-          <p:cNvPr id="15" name="PlaceHolder 1"/>
+          <p:cNvPr id="16" name="PlaceHolder 1"/>
           <p:cNvSpPr>
             <a:spLocks noGrp="1"/>
           </p:cNvSpPr>
@@ -1678,7 +1580,7 @@
         <p:spPr>
           <a:xfrm>
             <a:off x="3154680" y="10083960"/>
-            <a:ext cx="35752320" cy="6957360"/>
+            <a:ext cx="35751960" cy="6957000"/>
           </a:xfrm>
           <a:prstGeom prst="rect">
             <a:avLst/>
@@ -1697,14 +1599,14 @@
                   <a:srgbClr val="ffffff"/>
                 </a:solidFill>
               </a:uFill>
-              <a:latin typeface="Nimbus Sans"/>
+              <a:latin typeface="Arial"/>
             </a:endParaRPr>
           </a:p>
         </p:txBody>
       </p:sp>
       <p:sp>
         <p:nvSpPr>
-          <p:cNvPr id="16" name="PlaceHolder 2"/>
+          <p:cNvPr id="17" name="PlaceHolder 2"/>
           <p:cNvSpPr>
             <a:spLocks noGrp="1"/>
           </p:cNvSpPr>
@@ -1715,7 +1617,7 @@
         <p:spPr>
           <a:xfrm>
             <a:off x="2103120" y="7595640"/>
-            <a:ext cx="18473400" cy="18826920"/>
+            <a:ext cx="18473400" cy="18826560"/>
           </a:xfrm>
           <a:prstGeom prst="rect">
             <a:avLst/>
@@ -1733,14 +1635,14 @@
                   <a:srgbClr val="ffffff"/>
                 </a:solidFill>
               </a:uFill>
-              <a:latin typeface="Nimbus Sans"/>
+              <a:latin typeface="Arial"/>
             </a:endParaRPr>
           </a:p>
         </p:txBody>
       </p:sp>
       <p:sp>
         <p:nvSpPr>
-          <p:cNvPr id="17" name="PlaceHolder 3"/>
+          <p:cNvPr id="18" name="PlaceHolder 3"/>
           <p:cNvSpPr>
             <a:spLocks noGrp="1"/>
           </p:cNvSpPr>
@@ -1769,14 +1671,14 @@
                   <a:srgbClr val="ffffff"/>
                 </a:solidFill>
               </a:uFill>
-              <a:latin typeface="Nimbus Sans"/>
+              <a:latin typeface="Arial"/>
             </a:endParaRPr>
           </a:p>
         </p:txBody>
       </p:sp>
       <p:sp>
         <p:nvSpPr>
-          <p:cNvPr id="18" name="PlaceHolder 4"/>
+          <p:cNvPr id="19" name="PlaceHolder 4"/>
           <p:cNvSpPr>
             <a:spLocks noGrp="1"/>
           </p:cNvSpPr>
@@ -1805,7 +1707,7 @@
                   <a:srgbClr val="ffffff"/>
                 </a:solidFill>
               </a:uFill>
-              <a:latin typeface="Nimbus Sans"/>
+              <a:latin typeface="Arial"/>
             </a:endParaRPr>
           </a:p>
         </p:txBody>
@@ -1834,7 +1736,7 @@
       </p:grpSpPr>
       <p:sp>
         <p:nvSpPr>
-          <p:cNvPr id="19" name="PlaceHolder 1"/>
+          <p:cNvPr id="20" name="PlaceHolder 1"/>
           <p:cNvSpPr>
             <a:spLocks noGrp="1"/>
           </p:cNvSpPr>
@@ -1845,7 +1747,7 @@
         <p:spPr>
           <a:xfrm>
             <a:off x="3154680" y="10083960"/>
-            <a:ext cx="35752320" cy="6957360"/>
+            <a:ext cx="35751960" cy="6957000"/>
           </a:xfrm>
           <a:prstGeom prst="rect">
             <a:avLst/>
@@ -1864,14 +1766,14 @@
                   <a:srgbClr val="ffffff"/>
                 </a:solidFill>
               </a:uFill>
-              <a:latin typeface="Nimbus Sans"/>
+              <a:latin typeface="Arial"/>
             </a:endParaRPr>
           </a:p>
         </p:txBody>
       </p:sp>
       <p:sp>
         <p:nvSpPr>
-          <p:cNvPr id="20" name="PlaceHolder 2"/>
+          <p:cNvPr id="21" name="PlaceHolder 2"/>
           <p:cNvSpPr>
             <a:spLocks noGrp="1"/>
           </p:cNvSpPr>
@@ -1900,14 +1802,14 @@
                   <a:srgbClr val="ffffff"/>
                 </a:solidFill>
               </a:uFill>
-              <a:latin typeface="Nimbus Sans"/>
+              <a:latin typeface="Arial"/>
             </a:endParaRPr>
           </a:p>
         </p:txBody>
       </p:sp>
       <p:sp>
         <p:nvSpPr>
-          <p:cNvPr id="21" name="PlaceHolder 3"/>
+          <p:cNvPr id="22" name="PlaceHolder 3"/>
           <p:cNvSpPr>
             <a:spLocks noGrp="1"/>
           </p:cNvSpPr>
@@ -1936,14 +1838,14 @@
                   <a:srgbClr val="ffffff"/>
                 </a:solidFill>
               </a:uFill>
-              <a:latin typeface="Nimbus Sans"/>
+              <a:latin typeface="Arial"/>
             </a:endParaRPr>
           </a:p>
         </p:txBody>
       </p:sp>
       <p:sp>
         <p:nvSpPr>
-          <p:cNvPr id="22" name="PlaceHolder 4"/>
+          <p:cNvPr id="23" name="PlaceHolder 4"/>
           <p:cNvSpPr>
             <a:spLocks noGrp="1"/>
           </p:cNvSpPr>
@@ -1954,7 +1856,7 @@
         <p:spPr>
           <a:xfrm>
             <a:off x="2103120" y="17429400"/>
-            <a:ext cx="37855800" cy="8980200"/>
+            <a:ext cx="37855440" cy="8980200"/>
           </a:xfrm>
           <a:prstGeom prst="rect">
             <a:avLst/>
@@ -1972,7 +1874,7 @@
                   <a:srgbClr val="ffffff"/>
                 </a:solidFill>
               </a:uFill>
-              <a:latin typeface="Nimbus Sans"/>
+              <a:latin typeface="Arial"/>
             </a:endParaRPr>
           </a:p>
         </p:txBody>
@@ -2019,7 +1921,7 @@
         <p:spPr>
           <a:xfrm>
             <a:off x="0" y="0"/>
-            <a:ext cx="42061680" cy="32460480"/>
+            <a:ext cx="42061320" cy="32460120"/>
           </a:xfrm>
           <a:prstGeom prst="rect">
             <a:avLst/>
@@ -2042,7 +1944,7 @@
         <p:spPr>
           <a:xfrm>
             <a:off x="3154680" y="10083960"/>
-            <a:ext cx="35752320" cy="6957360"/>
+            <a:ext cx="35751960" cy="6957000"/>
           </a:xfrm>
           <a:prstGeom prst="rect">
             <a:avLst/>
@@ -2051,6 +1953,51 @@
         <p:txBody>
           <a:bodyPr lIns="0" rIns="0" tIns="0" bIns="0" anchor="ctr"/>
           <a:p>
+            <a:pPr algn="ctr"/>
+            <a:endParaRPr b="0" lang="en-US" sz="4400" spc="-1" strike="noStrike">
+              <a:solidFill>
+                <a:srgbClr val="000000"/>
+              </a:solidFill>
+              <a:uFill>
+                <a:solidFill>
+                  <a:srgbClr val="ffffff"/>
+                </a:solidFill>
+              </a:uFill>
+              <a:latin typeface="Arial"/>
+            </a:endParaRPr>
+          </a:p>
+        </p:txBody>
+      </p:sp>
+      <p:sp>
+        <p:nvSpPr>
+          <p:cNvPr id="2" name="PlaceHolder 2"/>
+          <p:cNvSpPr>
+            <a:spLocks noGrp="1"/>
+          </p:cNvSpPr>
+          <p:nvPr>
+            <p:ph type="body"/>
+          </p:nvPr>
+        </p:nvSpPr>
+        <p:spPr>
+          <a:xfrm>
+            <a:off x="2103120" y="7595640"/>
+            <a:ext cx="37855440" cy="18826560"/>
+          </a:xfrm>
+          <a:prstGeom prst="rect">
+            <a:avLst/>
+          </a:prstGeom>
+        </p:spPr>
+        <p:txBody>
+          <a:bodyPr lIns="0" rIns="0" tIns="0" bIns="0"/>
+          <a:p>
+            <a:pPr marL="432000" indent="-324000">
+              <a:buClr>
+                <a:srgbClr val="000000"/>
+              </a:buClr>
+              <a:buSzPct val="45000"/>
+              <a:buFont typeface="Wingdings" charset="2"/>
+              <a:buChar char=""/>
+            </a:pPr>
             <a:r>
               <a:rPr b="0" lang="en-US" sz="1800" spc="-1" strike="noStrike">
                 <a:solidFill>
@@ -2061,20 +2008,230 @@
                     <a:srgbClr val="ffffff"/>
                   </a:solidFill>
                 </a:uFill>
-                <a:latin typeface="Nimbus Sans"/>
-              </a:rPr>
-              <a:t>Click to edit the title text format</a:t>
-            </a:r>
-            <a:endParaRPr b="0" lang="en-US" sz="1800" spc="-1" strike="noStrike">
-              <a:solidFill>
-                <a:srgbClr val="000000"/>
-              </a:solidFill>
-              <a:uFill>
-                <a:solidFill>
-                  <a:srgbClr val="ffffff"/>
-                </a:solidFill>
-              </a:uFill>
-              <a:latin typeface="Nimbus Sans"/>
+                <a:latin typeface="Arial"/>
+              </a:rPr>
+              <a:t>Click to edit the outline text format</a:t>
+            </a:r>
+            <a:endParaRPr b="0" lang="en-US" sz="1800" spc="-1" strike="noStrike">
+              <a:solidFill>
+                <a:srgbClr val="000000"/>
+              </a:solidFill>
+              <a:uFill>
+                <a:solidFill>
+                  <a:srgbClr val="ffffff"/>
+                </a:solidFill>
+              </a:uFill>
+              <a:latin typeface="Arial"/>
+            </a:endParaRPr>
+          </a:p>
+          <a:p>
+            <a:pPr lvl="1" marL="864000" indent="-324000">
+              <a:buClr>
+                <a:srgbClr val="000000"/>
+              </a:buClr>
+              <a:buSzPct val="75000"/>
+              <a:buFont typeface="Symbol" charset="2"/>
+              <a:buChar char=""/>
+            </a:pPr>
+            <a:r>
+              <a:rPr b="0" lang="en-US" sz="1800" spc="-1" strike="noStrike">
+                <a:solidFill>
+                  <a:srgbClr val="000000"/>
+                </a:solidFill>
+                <a:uFill>
+                  <a:solidFill>
+                    <a:srgbClr val="ffffff"/>
+                  </a:solidFill>
+                </a:uFill>
+                <a:latin typeface="Arial"/>
+              </a:rPr>
+              <a:t>Second Outline Level</a:t>
+            </a:r>
+            <a:endParaRPr b="0" lang="en-US" sz="1800" spc="-1" strike="noStrike">
+              <a:solidFill>
+                <a:srgbClr val="000000"/>
+              </a:solidFill>
+              <a:uFill>
+                <a:solidFill>
+                  <a:srgbClr val="ffffff"/>
+                </a:solidFill>
+              </a:uFill>
+              <a:latin typeface="Arial"/>
+            </a:endParaRPr>
+          </a:p>
+          <a:p>
+            <a:pPr lvl="2" marL="1296000" indent="-288000">
+              <a:buClr>
+                <a:srgbClr val="000000"/>
+              </a:buClr>
+              <a:buSzPct val="45000"/>
+              <a:buFont typeface="Wingdings" charset="2"/>
+              <a:buChar char=""/>
+            </a:pPr>
+            <a:r>
+              <a:rPr b="0" lang="en-US" sz="1800" spc="-1" strike="noStrike">
+                <a:solidFill>
+                  <a:srgbClr val="000000"/>
+                </a:solidFill>
+                <a:uFill>
+                  <a:solidFill>
+                    <a:srgbClr val="ffffff"/>
+                  </a:solidFill>
+                </a:uFill>
+                <a:latin typeface="Arial"/>
+              </a:rPr>
+              <a:t>Third Outline Level</a:t>
+            </a:r>
+            <a:endParaRPr b="0" lang="en-US" sz="1800" spc="-1" strike="noStrike">
+              <a:solidFill>
+                <a:srgbClr val="000000"/>
+              </a:solidFill>
+              <a:uFill>
+                <a:solidFill>
+                  <a:srgbClr val="ffffff"/>
+                </a:solidFill>
+              </a:uFill>
+              <a:latin typeface="Arial"/>
+            </a:endParaRPr>
+          </a:p>
+          <a:p>
+            <a:pPr lvl="3" marL="1728000" indent="-216000">
+              <a:buClr>
+                <a:srgbClr val="000000"/>
+              </a:buClr>
+              <a:buSzPct val="75000"/>
+              <a:buFont typeface="Symbol" charset="2"/>
+              <a:buChar char=""/>
+            </a:pPr>
+            <a:r>
+              <a:rPr b="0" lang="en-US" sz="1800" spc="-1" strike="noStrike">
+                <a:solidFill>
+                  <a:srgbClr val="000000"/>
+                </a:solidFill>
+                <a:uFill>
+                  <a:solidFill>
+                    <a:srgbClr val="ffffff"/>
+                  </a:solidFill>
+                </a:uFill>
+                <a:latin typeface="Arial"/>
+              </a:rPr>
+              <a:t>Fourth Outline Level</a:t>
+            </a:r>
+            <a:endParaRPr b="0" lang="en-US" sz="1800" spc="-1" strike="noStrike">
+              <a:solidFill>
+                <a:srgbClr val="000000"/>
+              </a:solidFill>
+              <a:uFill>
+                <a:solidFill>
+                  <a:srgbClr val="ffffff"/>
+                </a:solidFill>
+              </a:uFill>
+              <a:latin typeface="Arial"/>
+            </a:endParaRPr>
+          </a:p>
+          <a:p>
+            <a:pPr lvl="4" marL="2160000" indent="-216000">
+              <a:buClr>
+                <a:srgbClr val="000000"/>
+              </a:buClr>
+              <a:buSzPct val="45000"/>
+              <a:buFont typeface="Wingdings" charset="2"/>
+              <a:buChar char=""/>
+            </a:pPr>
+            <a:r>
+              <a:rPr b="0" lang="en-US" sz="1800" spc="-1" strike="noStrike">
+                <a:solidFill>
+                  <a:srgbClr val="000000"/>
+                </a:solidFill>
+                <a:uFill>
+                  <a:solidFill>
+                    <a:srgbClr val="ffffff"/>
+                  </a:solidFill>
+                </a:uFill>
+                <a:latin typeface="Arial"/>
+              </a:rPr>
+              <a:t>Fifth Outline Level</a:t>
+            </a:r>
+            <a:endParaRPr b="0" lang="en-US" sz="1800" spc="-1" strike="noStrike">
+              <a:solidFill>
+                <a:srgbClr val="000000"/>
+              </a:solidFill>
+              <a:uFill>
+                <a:solidFill>
+                  <a:srgbClr val="ffffff"/>
+                </a:solidFill>
+              </a:uFill>
+              <a:latin typeface="Arial"/>
+            </a:endParaRPr>
+          </a:p>
+          <a:p>
+            <a:pPr lvl="5" marL="2592000" indent="-216000">
+              <a:buClr>
+                <a:srgbClr val="000000"/>
+              </a:buClr>
+              <a:buSzPct val="45000"/>
+              <a:buFont typeface="Wingdings" charset="2"/>
+              <a:buChar char=""/>
+            </a:pPr>
+            <a:r>
+              <a:rPr b="0" lang="en-US" sz="1800" spc="-1" strike="noStrike">
+                <a:solidFill>
+                  <a:srgbClr val="000000"/>
+                </a:solidFill>
+                <a:uFill>
+                  <a:solidFill>
+                    <a:srgbClr val="ffffff"/>
+                  </a:solidFill>
+                </a:uFill>
+                <a:latin typeface="Arial"/>
+              </a:rPr>
+              <a:t>Sixth Outline Level</a:t>
+            </a:r>
+            <a:endParaRPr b="0" lang="en-US" sz="1800" spc="-1" strike="noStrike">
+              <a:solidFill>
+                <a:srgbClr val="000000"/>
+              </a:solidFill>
+              <a:uFill>
+                <a:solidFill>
+                  <a:srgbClr val="ffffff"/>
+                </a:solidFill>
+              </a:uFill>
+              <a:latin typeface="Arial"/>
+            </a:endParaRPr>
+          </a:p>
+          <a:p>
+            <a:pPr lvl="6" marL="3024000" indent="-216000">
+              <a:buClr>
+                <a:srgbClr val="000000"/>
+              </a:buClr>
+              <a:buSzPct val="45000"/>
+              <a:buFont typeface="Wingdings" charset="2"/>
+              <a:buChar char=""/>
+            </a:pPr>
+            <a:r>
+              <a:rPr b="0" lang="en-US" sz="1800" spc="-1" strike="noStrike">
+                <a:solidFill>
+                  <a:srgbClr val="000000"/>
+                </a:solidFill>
+                <a:uFill>
+                  <a:solidFill>
+                    <a:srgbClr val="ffffff"/>
+                  </a:solidFill>
+                </a:uFill>
+                <a:latin typeface="Arial"/>
+              </a:rPr>
+              <a:t>Seventh Outline Level</a:t>
+            </a:r>
+            <a:endParaRPr b="0" lang="en-US" sz="1800" spc="-1" strike="noStrike">
+              <a:solidFill>
+                <a:srgbClr val="000000"/>
+              </a:solidFill>
+              <a:uFill>
+                <a:solidFill>
+                  <a:srgbClr val="ffffff"/>
+                </a:solidFill>
+              </a:uFill>
+              <a:latin typeface="Arial"/>
             </a:endParaRPr>
           </a:p>
         </p:txBody>
@@ -2118,14 +2275,14 @@
       </p:grpSpPr>
       <p:sp>
         <p:nvSpPr>
-          <p:cNvPr id="43" name="CustomShape 1"/>
+          <p:cNvPr id="42" name="CustomShape 1"/>
           <p:cNvSpPr/>
           <p:nvPr/>
         </p:nvSpPr>
         <p:spPr>
           <a:xfrm>
             <a:off x="11545560" y="2503080"/>
-            <a:ext cx="18951120" cy="1365120"/>
+            <a:ext cx="18950760" cy="1364760"/>
           </a:xfrm>
           <a:prstGeom prst="rect">
             <a:avLst/>
@@ -2160,6 +2317,7 @@
                   </a:solidFill>
                 </a:uFill>
                 <a:latin typeface="Trebuchet MS"/>
+                <a:ea typeface="DejaVu Sans"/>
               </a:rPr>
               <a:t>BREW.AI</a:t>
             </a:r>
@@ -2172,21 +2330,21 @@
                   <a:srgbClr val="ffffff"/>
                 </a:solidFill>
               </a:uFill>
-              <a:latin typeface="Nimbus Sans"/>
+              <a:latin typeface="Arial"/>
             </a:endParaRPr>
           </a:p>
         </p:txBody>
       </p:sp>
       <p:sp>
         <p:nvSpPr>
-          <p:cNvPr id="44" name="CustomShape 2"/>
+          <p:cNvPr id="43" name="CustomShape 2"/>
           <p:cNvSpPr/>
           <p:nvPr/>
         </p:nvSpPr>
         <p:spPr>
           <a:xfrm>
             <a:off x="11545560" y="3868920"/>
-            <a:ext cx="18951120" cy="1990800"/>
+            <a:ext cx="18950760" cy="1990440"/>
           </a:xfrm>
           <a:prstGeom prst="rect">
             <a:avLst/>
@@ -2221,6 +2379,7 @@
                   </a:solidFill>
                 </a:uFill>
                 <a:latin typeface="Trebuchet MS"/>
+                <a:ea typeface="DejaVu Sans"/>
               </a:rPr>
               <a:t>The adaptive brewing solution</a:t>
             </a:r>
@@ -2233,21 +2392,21 @@
                   <a:srgbClr val="ffffff"/>
                 </a:solidFill>
               </a:uFill>
-              <a:latin typeface="Nimbus Sans"/>
+              <a:latin typeface="Arial"/>
             </a:endParaRPr>
           </a:p>
         </p:txBody>
       </p:sp>
       <p:sp>
         <p:nvSpPr>
-          <p:cNvPr id="45" name="CustomShape 3"/>
+          <p:cNvPr id="44" name="CustomShape 3"/>
           <p:cNvSpPr/>
           <p:nvPr/>
         </p:nvSpPr>
         <p:spPr>
           <a:xfrm>
             <a:off x="11521440" y="13533120"/>
-            <a:ext cx="9221760" cy="20170800"/>
+            <a:ext cx="9221400" cy="20170440"/>
           </a:xfrm>
           <a:prstGeom prst="rect">
             <a:avLst/>
@@ -2295,7 +2454,7 @@
                   <a:srgbClr val="ffffff"/>
                 </a:solidFill>
               </a:uFill>
-              <a:latin typeface="Nimbus Sans"/>
+              <a:latin typeface="Arial"/>
             </a:endParaRPr>
           </a:p>
           <a:p>
@@ -2343,7 +2502,7 @@
                   <a:srgbClr val="ffffff"/>
                 </a:solidFill>
               </a:uFill>
-              <a:latin typeface="Nimbus Sans"/>
+              <a:latin typeface="Arial"/>
             </a:endParaRPr>
           </a:p>
           <a:p>
@@ -2361,21 +2520,21 @@
                   <a:srgbClr val="ffffff"/>
                 </a:solidFill>
               </a:uFill>
-              <a:latin typeface="Nimbus Sans"/>
+              <a:latin typeface="Arial"/>
             </a:endParaRPr>
           </a:p>
         </p:txBody>
       </p:sp>
       <p:sp>
         <p:nvSpPr>
-          <p:cNvPr id="46" name="CustomShape 4"/>
+          <p:cNvPr id="45" name="CustomShape 4"/>
           <p:cNvSpPr/>
           <p:nvPr/>
         </p:nvSpPr>
         <p:spPr>
           <a:xfrm>
             <a:off x="21305520" y="5486400"/>
-            <a:ext cx="9221760" cy="19439640"/>
+            <a:ext cx="9221400" cy="19439280"/>
           </a:xfrm>
           <a:prstGeom prst="rect">
             <a:avLst/>
@@ -2423,11 +2582,11 @@
                   <a:srgbClr val="ffffff"/>
                 </a:solidFill>
               </a:uFill>
-              <a:latin typeface="Nimbus Sans"/>
-            </a:endParaRPr>
-          </a:p>
-          <a:p>
-            <a:pPr marL="457200" indent="-456480">
+              <a:latin typeface="Arial"/>
+            </a:endParaRPr>
+          </a:p>
+          <a:p>
+            <a:pPr marL="457200" indent="-456120">
               <a:lnSpc>
                 <a:spcPct val="100000"/>
               </a:lnSpc>
@@ -2450,22 +2609,22 @@
                 <a:latin typeface="Trebuchet MS"/>
                 <a:ea typeface="DejaVu Sans"/>
               </a:rPr>
-              <a:t>Nullam vehicula luctus augue, rutrum faucibus massa pharetra eu. Nulla facilisi. </a:t>
-            </a:r>
-            <a:endParaRPr b="0" lang="en-US" sz="1800" spc="-1" strike="noStrike">
-              <a:solidFill>
-                <a:srgbClr val="000000"/>
-              </a:solidFill>
-              <a:uFill>
-                <a:solidFill>
-                  <a:srgbClr val="ffffff"/>
-                </a:solidFill>
-              </a:uFill>
-              <a:latin typeface="Nimbus Sans"/>
-            </a:endParaRPr>
-          </a:p>
-          <a:p>
-            <a:pPr marL="457200" indent="-456480">
+              <a:t>Reenforcement Learning Using the Keras Library</a:t>
+            </a:r>
+            <a:endParaRPr b="0" lang="en-US" sz="1800" spc="-1" strike="noStrike">
+              <a:solidFill>
+                <a:srgbClr val="000000"/>
+              </a:solidFill>
+              <a:uFill>
+                <a:solidFill>
+                  <a:srgbClr val="ffffff"/>
+                </a:solidFill>
+              </a:uFill>
+              <a:latin typeface="Arial"/>
+            </a:endParaRPr>
+          </a:p>
+          <a:p>
+            <a:pPr marL="457200" indent="-456120">
               <a:lnSpc>
                 <a:spcPct val="100000"/>
               </a:lnSpc>
@@ -2488,22 +2647,22 @@
                 <a:latin typeface="Trebuchet MS"/>
                 <a:ea typeface="DejaVu Sans"/>
               </a:rPr>
-              <a:t>Sed posuere gravida felis, sed pulvinar urna suscipit et. Suspendisse diam tortor, mollis eu accumsan eget, elementum id justo. </a:t>
-            </a:r>
-            <a:endParaRPr b="0" lang="en-US" sz="1800" spc="-1" strike="noStrike">
-              <a:solidFill>
-                <a:srgbClr val="000000"/>
-              </a:solidFill>
-              <a:uFill>
-                <a:solidFill>
-                  <a:srgbClr val="ffffff"/>
-                </a:solidFill>
-              </a:uFill>
-              <a:latin typeface="Nimbus Sans"/>
-            </a:endParaRPr>
-          </a:p>
-          <a:p>
-            <a:pPr marL="457200" indent="-456480">
+              <a:t>Python and Java Codebase</a:t>
+            </a:r>
+            <a:endParaRPr b="0" lang="en-US" sz="1800" spc="-1" strike="noStrike">
+              <a:solidFill>
+                <a:srgbClr val="000000"/>
+              </a:solidFill>
+              <a:uFill>
+                <a:solidFill>
+                  <a:srgbClr val="ffffff"/>
+                </a:solidFill>
+              </a:uFill>
+              <a:latin typeface="Arial"/>
+            </a:endParaRPr>
+          </a:p>
+          <a:p>
+            <a:pPr marL="457200" indent="-456120">
               <a:lnSpc>
                 <a:spcPct val="100000"/>
               </a:lnSpc>
@@ -2526,22 +2685,22 @@
                 <a:latin typeface="Trebuchet MS"/>
                 <a:ea typeface="DejaVu Sans"/>
               </a:rPr>
-              <a:t>Vivamus pulvinar varius lacus, vel egestas ligula gravida volutpat. </a:t>
-            </a:r>
-            <a:endParaRPr b="0" lang="en-US" sz="1800" spc="-1" strike="noStrike">
-              <a:solidFill>
-                <a:srgbClr val="000000"/>
-              </a:solidFill>
-              <a:uFill>
-                <a:solidFill>
-                  <a:srgbClr val="ffffff"/>
-                </a:solidFill>
-              </a:uFill>
-              <a:latin typeface="Nimbus Sans"/>
-            </a:endParaRPr>
-          </a:p>
-          <a:p>
-            <a:pPr marL="457200" indent="-456480">
+              <a:t>Raspberry Pi Device Controller</a:t>
+            </a:r>
+            <a:endParaRPr b="0" lang="en-US" sz="1800" spc="-1" strike="noStrike">
+              <a:solidFill>
+                <a:srgbClr val="000000"/>
+              </a:solidFill>
+              <a:uFill>
+                <a:solidFill>
+                  <a:srgbClr val="ffffff"/>
+                </a:solidFill>
+              </a:uFill>
+              <a:latin typeface="Arial"/>
+            </a:endParaRPr>
+          </a:p>
+          <a:p>
+            <a:pPr marL="457200" indent="-456120">
               <a:lnSpc>
                 <a:spcPct val="100000"/>
               </a:lnSpc>
@@ -2564,22 +2723,22 @@
                 <a:latin typeface="Trebuchet MS"/>
                 <a:ea typeface="DejaVu Sans"/>
               </a:rPr>
-              <a:t>Aliquam varius augue at dui pulvinar iaculis. Nullam a nisl quam, quis lacinia augue. </a:t>
-            </a:r>
-            <a:endParaRPr b="0" lang="en-US" sz="1800" spc="-1" strike="noStrike">
-              <a:solidFill>
-                <a:srgbClr val="000000"/>
-              </a:solidFill>
-              <a:uFill>
-                <a:solidFill>
-                  <a:srgbClr val="ffffff"/>
-                </a:solidFill>
-              </a:uFill>
-              <a:latin typeface="Nimbus Sans"/>
-            </a:endParaRPr>
-          </a:p>
-          <a:p>
-            <a:pPr marL="457200" indent="-456480">
+              <a:t>Android App Interface</a:t>
+            </a:r>
+            <a:endParaRPr b="0" lang="en-US" sz="1800" spc="-1" strike="noStrike">
+              <a:solidFill>
+                <a:srgbClr val="000000"/>
+              </a:solidFill>
+              <a:uFill>
+                <a:solidFill>
+                  <a:srgbClr val="ffffff"/>
+                </a:solidFill>
+              </a:uFill>
+              <a:latin typeface="Arial"/>
+            </a:endParaRPr>
+          </a:p>
+          <a:p>
+            <a:pPr marL="457200" indent="-456120">
               <a:lnSpc>
                 <a:spcPct val="100000"/>
               </a:lnSpc>
@@ -2602,18 +2761,208 @@
                 <a:latin typeface="Trebuchet MS"/>
                 <a:ea typeface="DejaVu Sans"/>
               </a:rPr>
-              <a:t>Nam tristique porttitor quam, in consequat urna condimentum eu. </a:t>
-            </a:r>
-            <a:endParaRPr b="0" lang="en-US" sz="1800" spc="-1" strike="noStrike">
-              <a:solidFill>
-                <a:srgbClr val="000000"/>
-              </a:solidFill>
-              <a:uFill>
-                <a:solidFill>
-                  <a:srgbClr val="ffffff"/>
-                </a:solidFill>
-              </a:uFill>
-              <a:latin typeface="Nimbus Sans"/>
+              <a:t>Raspberry Pi to Android Bluetooth Connection</a:t>
+            </a:r>
+            <a:endParaRPr b="0" lang="en-US" sz="1800" spc="-1" strike="noStrike">
+              <a:solidFill>
+                <a:srgbClr val="000000"/>
+              </a:solidFill>
+              <a:uFill>
+                <a:solidFill>
+                  <a:srgbClr val="ffffff"/>
+                </a:solidFill>
+              </a:uFill>
+              <a:latin typeface="Arial"/>
+            </a:endParaRPr>
+          </a:p>
+          <a:p>
+            <a:pPr marL="457200" indent="-456120">
+              <a:lnSpc>
+                <a:spcPct val="100000"/>
+              </a:lnSpc>
+              <a:buClr>
+                <a:srgbClr val="000000"/>
+              </a:buClr>
+              <a:buFont typeface="Arial"/>
+              <a:buChar char="•"/>
+            </a:pPr>
+            <a:r>
+              <a:rPr b="0" lang="en-US" sz="4400" spc="-1" strike="noStrike">
+                <a:solidFill>
+                  <a:srgbClr val="000000"/>
+                </a:solidFill>
+                <a:uFill>
+                  <a:solidFill>
+                    <a:srgbClr val="ffffff"/>
+                  </a:solidFill>
+                </a:uFill>
+                <a:latin typeface="Trebuchet MS"/>
+                <a:ea typeface="DejaVu Sans"/>
+              </a:rPr>
+              <a:t>Bluez Module for Controller Bluetooth Connection</a:t>
+            </a:r>
+            <a:endParaRPr b="0" lang="en-US" sz="1800" spc="-1" strike="noStrike">
+              <a:solidFill>
+                <a:srgbClr val="000000"/>
+              </a:solidFill>
+              <a:uFill>
+                <a:solidFill>
+                  <a:srgbClr val="ffffff"/>
+                </a:solidFill>
+              </a:uFill>
+              <a:latin typeface="Arial"/>
+            </a:endParaRPr>
+          </a:p>
+          <a:p>
+            <a:pPr marL="457200" indent="-456120">
+              <a:lnSpc>
+                <a:spcPct val="100000"/>
+              </a:lnSpc>
+              <a:buClr>
+                <a:srgbClr val="000000"/>
+              </a:buClr>
+              <a:buFont typeface="Arial"/>
+              <a:buChar char="•"/>
+            </a:pPr>
+            <a:r>
+              <a:rPr b="0" lang="en-US" sz="4400" spc="-1" strike="noStrike">
+                <a:solidFill>
+                  <a:srgbClr val="000000"/>
+                </a:solidFill>
+                <a:uFill>
+                  <a:solidFill>
+                    <a:srgbClr val="ffffff"/>
+                  </a:solidFill>
+                </a:uFill>
+                <a:latin typeface="Trebuchet MS"/>
+                <a:ea typeface="DejaVu Sans"/>
+              </a:rPr>
+              <a:t>Measurement of CO2, Temperature, Specific Gravity Data During Brewing</a:t>
+            </a:r>
+            <a:endParaRPr b="0" lang="en-US" sz="1800" spc="-1" strike="noStrike">
+              <a:solidFill>
+                <a:srgbClr val="000000"/>
+              </a:solidFill>
+              <a:uFill>
+                <a:solidFill>
+                  <a:srgbClr val="ffffff"/>
+                </a:solidFill>
+              </a:uFill>
+              <a:latin typeface="Arial"/>
+            </a:endParaRPr>
+          </a:p>
+          <a:p>
+            <a:pPr marL="457200" indent="-456120">
+              <a:lnSpc>
+                <a:spcPct val="100000"/>
+              </a:lnSpc>
+              <a:buClr>
+                <a:srgbClr val="000000"/>
+              </a:buClr>
+              <a:buFont typeface="Arial"/>
+              <a:buChar char="•"/>
+            </a:pPr>
+            <a:r>
+              <a:rPr b="0" lang="en-US" sz="4400" spc="-1" strike="noStrike">
+                <a:solidFill>
+                  <a:srgbClr val="000000"/>
+                </a:solidFill>
+                <a:uFill>
+                  <a:solidFill>
+                    <a:srgbClr val="ffffff"/>
+                  </a:solidFill>
+                </a:uFill>
+                <a:latin typeface="Trebuchet MS"/>
+                <a:ea typeface="DejaVu Sans"/>
+              </a:rPr>
+              <a:t>Sores Batch Data in sqlite3 database</a:t>
+            </a:r>
+            <a:endParaRPr b="0" lang="en-US" sz="1800" spc="-1" strike="noStrike">
+              <a:solidFill>
+                <a:srgbClr val="000000"/>
+              </a:solidFill>
+              <a:uFill>
+                <a:solidFill>
+                  <a:srgbClr val="ffffff"/>
+                </a:solidFill>
+              </a:uFill>
+              <a:latin typeface="Arial"/>
+            </a:endParaRPr>
+          </a:p>
+          <a:p>
+            <a:pPr marL="457200" indent="-456120">
+              <a:lnSpc>
+                <a:spcPct val="100000"/>
+              </a:lnSpc>
+              <a:buClr>
+                <a:srgbClr val="000000"/>
+              </a:buClr>
+              <a:buFont typeface="Arial"/>
+              <a:buChar char="•"/>
+            </a:pPr>
+            <a:r>
+              <a:rPr b="0" lang="en-US" sz="4400" spc="-1" strike="noStrike">
+                <a:solidFill>
+                  <a:srgbClr val="000000"/>
+                </a:solidFill>
+                <a:uFill>
+                  <a:solidFill>
+                    <a:srgbClr val="ffffff"/>
+                  </a:solidFill>
+                </a:uFill>
+                <a:latin typeface="Trebuchet MS"/>
+                <a:ea typeface="DejaVu Sans"/>
+              </a:rPr>
+              <a:t>Stirring and Heating Capabilities</a:t>
+            </a:r>
+            <a:endParaRPr b="0" lang="en-US" sz="1800" spc="-1" strike="noStrike">
+              <a:solidFill>
+                <a:srgbClr val="000000"/>
+              </a:solidFill>
+              <a:uFill>
+                <a:solidFill>
+                  <a:srgbClr val="ffffff"/>
+                </a:solidFill>
+              </a:uFill>
+              <a:latin typeface="Arial"/>
+            </a:endParaRPr>
+          </a:p>
+          <a:p>
+            <a:pPr marL="457200" indent="-456120">
+              <a:lnSpc>
+                <a:spcPct val="100000"/>
+              </a:lnSpc>
+              <a:buClr>
+                <a:srgbClr val="000000"/>
+              </a:buClr>
+              <a:buFont typeface="Arial"/>
+              <a:buChar char="•"/>
+            </a:pPr>
+            <a:r>
+              <a:rPr b="0" lang="en-US" sz="4400" spc="-1" strike="noStrike">
+                <a:solidFill>
+                  <a:srgbClr val="000000"/>
+                </a:solidFill>
+                <a:uFill>
+                  <a:solidFill>
+                    <a:srgbClr val="ffffff"/>
+                  </a:solidFill>
+                </a:uFill>
+                <a:latin typeface="Trebuchet MS"/>
+                <a:ea typeface="DejaVu Sans"/>
+              </a:rPr>
+              <a:t> </a:t>
+            </a:r>
+            <a:endParaRPr b="0" lang="en-US" sz="1800" spc="-1" strike="noStrike">
+              <a:solidFill>
+                <a:srgbClr val="000000"/>
+              </a:solidFill>
+              <a:uFill>
+                <a:solidFill>
+                  <a:srgbClr val="ffffff"/>
+                </a:solidFill>
+              </a:uFill>
+              <a:latin typeface="Arial"/>
             </a:endParaRPr>
           </a:p>
           <a:p>
@@ -2631,21 +2980,39 @@
                   <a:srgbClr val="ffffff"/>
                 </a:solidFill>
               </a:uFill>
-              <a:latin typeface="Nimbus Sans"/>
+              <a:latin typeface="Arial"/>
+            </a:endParaRPr>
+          </a:p>
+          <a:p>
+            <a:pPr>
+              <a:lnSpc>
+                <a:spcPct val="100000"/>
+              </a:lnSpc>
+            </a:pPr>
+            <a:endParaRPr b="0" lang="en-US" sz="1800" spc="-1" strike="noStrike">
+              <a:solidFill>
+                <a:srgbClr val="000000"/>
+              </a:solidFill>
+              <a:uFill>
+                <a:solidFill>
+                  <a:srgbClr val="ffffff"/>
+                </a:solidFill>
+              </a:uFill>
+              <a:latin typeface="Arial"/>
             </a:endParaRPr>
           </a:p>
         </p:txBody>
       </p:sp>
       <p:sp>
         <p:nvSpPr>
-          <p:cNvPr id="47" name="CustomShape 5"/>
+          <p:cNvPr id="46" name="CustomShape 5"/>
           <p:cNvSpPr/>
           <p:nvPr/>
         </p:nvSpPr>
         <p:spPr>
           <a:xfrm>
             <a:off x="970200" y="4330800"/>
-            <a:ext cx="8562600" cy="27032760"/>
+            <a:ext cx="8562240" cy="27032400"/>
           </a:xfrm>
           <a:prstGeom prst="rect">
             <a:avLst/>
@@ -2693,7 +3060,7 @@
                   <a:srgbClr val="ffffff"/>
                 </a:solidFill>
               </a:uFill>
-              <a:latin typeface="Nimbus Sans"/>
+              <a:latin typeface="Arial"/>
             </a:endParaRPr>
           </a:p>
           <a:p>
@@ -2726,18 +3093,18 @@
                   <a:srgbClr val="ffffff"/>
                 </a:solidFill>
               </a:uFill>
-              <a:latin typeface="Nimbus Sans"/>
-            </a:endParaRPr>
-          </a:p>
-          <a:p>
-            <a:pPr marL="216000" indent="-216000">
+              <a:latin typeface="Arial"/>
+            </a:endParaRPr>
+          </a:p>
+          <a:p>
+            <a:pPr marL="216000" indent="-215640">
               <a:lnSpc>
                 <a:spcPct val="100000"/>
               </a:lnSpc>
               <a:buClr>
                 <a:srgbClr val="000000"/>
               </a:buClr>
-              <a:buFont typeface="Symbol" charset="2"/>
+              <a:buFont typeface="Symbol"/>
               <a:buChar char=""/>
             </a:pPr>
             <a:r>
@@ -2779,18 +3146,18 @@
                   <a:srgbClr val="ffffff"/>
                 </a:solidFill>
               </a:uFill>
-              <a:latin typeface="Nimbus Sans"/>
-            </a:endParaRPr>
-          </a:p>
-          <a:p>
-            <a:pPr marL="216000" indent="-216000">
+              <a:latin typeface="Arial"/>
+            </a:endParaRPr>
+          </a:p>
+          <a:p>
+            <a:pPr marL="216000" indent="-215640">
               <a:lnSpc>
                 <a:spcPct val="100000"/>
               </a:lnSpc>
               <a:buClr>
                 <a:srgbClr val="000000"/>
               </a:buClr>
-              <a:buFont typeface="Symbol" charset="2"/>
+              <a:buFont typeface="Symbol"/>
               <a:buChar char=""/>
             </a:pPr>
             <a:r>
@@ -2832,18 +3199,18 @@
                   <a:srgbClr val="ffffff"/>
                 </a:solidFill>
               </a:uFill>
-              <a:latin typeface="Nimbus Sans"/>
-            </a:endParaRPr>
-          </a:p>
-          <a:p>
-            <a:pPr marL="216000" indent="-216000">
+              <a:latin typeface="Arial"/>
+            </a:endParaRPr>
+          </a:p>
+          <a:p>
+            <a:pPr marL="216000" indent="-215640">
               <a:lnSpc>
                 <a:spcPct val="100000"/>
               </a:lnSpc>
               <a:buClr>
                 <a:srgbClr val="000000"/>
               </a:buClr>
-              <a:buFont typeface="Symbol" charset="2"/>
+              <a:buFont typeface="Symbol"/>
               <a:buChar char=""/>
             </a:pPr>
             <a:r>
@@ -2885,7 +3252,7 @@
                   <a:srgbClr val="ffffff"/>
                 </a:solidFill>
               </a:uFill>
-              <a:latin typeface="Nimbus Sans"/>
+              <a:latin typeface="Arial"/>
             </a:endParaRPr>
           </a:p>
           <a:p>
@@ -2903,7 +3270,7 @@
                   <a:srgbClr val="ffffff"/>
                 </a:solidFill>
               </a:uFill>
-              <a:latin typeface="Nimbus Sans"/>
+              <a:latin typeface="Arial"/>
             </a:endParaRPr>
           </a:p>
           <a:p>
@@ -2921,7 +3288,7 @@
                   <a:srgbClr val="ffffff"/>
                 </a:solidFill>
               </a:uFill>
-              <a:latin typeface="Nimbus Sans"/>
+              <a:latin typeface="Arial"/>
             </a:endParaRPr>
           </a:p>
           <a:p>
@@ -2939,7 +3306,7 @@
                   <a:srgbClr val="ffffff"/>
                 </a:solidFill>
               </a:uFill>
-              <a:latin typeface="Nimbus Sans"/>
+              <a:latin typeface="Arial"/>
             </a:endParaRPr>
           </a:p>
           <a:p>
@@ -2957,7 +3324,7 @@
                   <a:srgbClr val="ffffff"/>
                 </a:solidFill>
               </a:uFill>
-              <a:latin typeface="Nimbus Sans"/>
+              <a:latin typeface="Arial"/>
             </a:endParaRPr>
           </a:p>
           <a:p>
@@ -2975,7 +3342,7 @@
                   <a:srgbClr val="ffffff"/>
                 </a:solidFill>
               </a:uFill>
-              <a:latin typeface="Nimbus Sans"/>
+              <a:latin typeface="Arial"/>
             </a:endParaRPr>
           </a:p>
           <a:p>
@@ -2993,7 +3360,7 @@
                   <a:srgbClr val="ffffff"/>
                 </a:solidFill>
               </a:uFill>
-              <a:latin typeface="Nimbus Sans"/>
+              <a:latin typeface="Arial"/>
             </a:endParaRPr>
           </a:p>
           <a:p>
@@ -3011,7 +3378,7 @@
                   <a:srgbClr val="ffffff"/>
                 </a:solidFill>
               </a:uFill>
-              <a:latin typeface="Nimbus Sans"/>
+              <a:latin typeface="Arial"/>
             </a:endParaRPr>
           </a:p>
           <a:p>
@@ -3029,7 +3396,7 @@
                   <a:srgbClr val="ffffff"/>
                 </a:solidFill>
               </a:uFill>
-              <a:latin typeface="Nimbus Sans"/>
+              <a:latin typeface="Arial"/>
             </a:endParaRPr>
           </a:p>
           <a:p>
@@ -3047,7 +3414,7 @@
                   <a:srgbClr val="ffffff"/>
                 </a:solidFill>
               </a:uFill>
-              <a:latin typeface="Nimbus Sans"/>
+              <a:latin typeface="Arial"/>
             </a:endParaRPr>
           </a:p>
           <a:p>
@@ -3065,7 +3432,7 @@
                   <a:srgbClr val="ffffff"/>
                 </a:solidFill>
               </a:uFill>
-              <a:latin typeface="Nimbus Sans"/>
+              <a:latin typeface="Arial"/>
             </a:endParaRPr>
           </a:p>
           <a:p>
@@ -3083,7 +3450,7 @@
                   <a:srgbClr val="ffffff"/>
                 </a:solidFill>
               </a:uFill>
-              <a:latin typeface="Nimbus Sans"/>
+              <a:latin typeface="Arial"/>
             </a:endParaRPr>
           </a:p>
           <a:p>
@@ -3101,7 +3468,7 @@
                   <a:srgbClr val="ffffff"/>
                 </a:solidFill>
               </a:uFill>
-              <a:latin typeface="Nimbus Sans"/>
+              <a:latin typeface="Arial"/>
             </a:endParaRPr>
           </a:p>
           <a:p>
@@ -3119,7 +3486,7 @@
                   <a:srgbClr val="ffffff"/>
                 </a:solidFill>
               </a:uFill>
-              <a:latin typeface="Nimbus Sans"/>
+              <a:latin typeface="Arial"/>
             </a:endParaRPr>
           </a:p>
           <a:p>
@@ -3137,7 +3504,7 @@
                   <a:srgbClr val="ffffff"/>
                 </a:solidFill>
               </a:uFill>
-              <a:latin typeface="Nimbus Sans"/>
+              <a:latin typeface="Arial"/>
             </a:endParaRPr>
           </a:p>
           <a:p>
@@ -3155,7 +3522,7 @@
                   <a:srgbClr val="ffffff"/>
                 </a:solidFill>
               </a:uFill>
-              <a:latin typeface="Nimbus Sans"/>
+              <a:latin typeface="Arial"/>
             </a:endParaRPr>
           </a:p>
           <a:p>
@@ -3173,7 +3540,7 @@
                   <a:srgbClr val="ffffff"/>
                 </a:solidFill>
               </a:uFill>
-              <a:latin typeface="Nimbus Sans"/>
+              <a:latin typeface="Arial"/>
             </a:endParaRPr>
           </a:p>
           <a:p>
@@ -3191,7 +3558,7 @@
                   <a:srgbClr val="ffffff"/>
                 </a:solidFill>
               </a:uFill>
-              <a:latin typeface="Nimbus Sans"/>
+              <a:latin typeface="Arial"/>
             </a:endParaRPr>
           </a:p>
           <a:p>
@@ -3209,7 +3576,7 @@
                   <a:srgbClr val="ffffff"/>
                 </a:solidFill>
               </a:uFill>
-              <a:latin typeface="Nimbus Sans"/>
+              <a:latin typeface="Arial"/>
             </a:endParaRPr>
           </a:p>
           <a:p>
@@ -3227,7 +3594,7 @@
                   <a:srgbClr val="ffffff"/>
                 </a:solidFill>
               </a:uFill>
-              <a:latin typeface="Nimbus Sans"/>
+              <a:latin typeface="Arial"/>
             </a:endParaRPr>
           </a:p>
           <a:p>
@@ -3245,7 +3612,7 @@
                   <a:srgbClr val="ffffff"/>
                 </a:solidFill>
               </a:uFill>
-              <a:latin typeface="Nimbus Sans"/>
+              <a:latin typeface="Arial"/>
             </a:endParaRPr>
           </a:p>
           <a:p>
@@ -3278,7 +3645,7 @@
                   <a:srgbClr val="ffffff"/>
                 </a:solidFill>
               </a:uFill>
-              <a:latin typeface="Nimbus Sans"/>
+              <a:latin typeface="Arial"/>
             </a:endParaRPr>
           </a:p>
           <a:p>
@@ -3300,8 +3667,31 @@
                 <a:latin typeface="Trebuchet MS"/>
                 <a:ea typeface="DejaVu Sans"/>
               </a:rPr>
-              <a:t>To</a:t>
-            </a:r>
+              <a:t>To handle these constraints, we employed </a:t>
+            </a:r>
+            <a:endParaRPr b="0" lang="en-US" sz="1800" spc="-1" strike="noStrike">
+              <a:solidFill>
+                <a:srgbClr val="000000"/>
+              </a:solidFill>
+              <a:uFill>
+                <a:solidFill>
+                  <a:srgbClr val="ffffff"/>
+                </a:solidFill>
+              </a:uFill>
+              <a:latin typeface="Arial"/>
+            </a:endParaRPr>
+          </a:p>
+          <a:p>
+            <a:pPr marL="216000" indent="-215640">
+              <a:lnSpc>
+                <a:spcPct val="100000"/>
+              </a:lnSpc>
+              <a:buClr>
+                <a:srgbClr val="000000"/>
+              </a:buClr>
+              <a:buFont typeface="Symbol"/>
+              <a:buChar char=""/>
+            </a:pPr>
             <a:r>
               <a:rPr b="0" lang="en-US" sz="4000" spc="-1" strike="noStrike">
                 <a:solidFill>
@@ -3315,31 +3705,8 @@
                 <a:latin typeface="Trebuchet MS"/>
                 <a:ea typeface="DejaVu Sans"/>
               </a:rPr>
-              <a:t> handle these constraints, we employed </a:t>
-            </a:r>
-            <a:endParaRPr b="0" lang="en-US" sz="1800" spc="-1" strike="noStrike">
-              <a:solidFill>
-                <a:srgbClr val="000000"/>
-              </a:solidFill>
-              <a:uFill>
-                <a:solidFill>
-                  <a:srgbClr val="ffffff"/>
-                </a:solidFill>
-              </a:uFill>
-              <a:latin typeface="Nimbus Sans"/>
-            </a:endParaRPr>
-          </a:p>
-          <a:p>
-            <a:pPr marL="216000" indent="-216000">
-              <a:lnSpc>
-                <a:spcPct val="100000"/>
-              </a:lnSpc>
-              <a:buClr>
-                <a:srgbClr val="000000"/>
-              </a:buClr>
-              <a:buFont typeface="Symbol" charset="2"/>
-              <a:buChar char=""/>
-            </a:pPr>
+              <a:t> </a:t>
+            </a:r>
             <a:r>
               <a:rPr b="0" lang="en-US" sz="4000" spc="-1" strike="noStrike">
                 <a:solidFill>
@@ -3353,8 +3720,31 @@
                 <a:latin typeface="Trebuchet MS"/>
                 <a:ea typeface="DejaVu Sans"/>
               </a:rPr>
-              <a:t> </a:t>
-            </a:r>
+              <a:t>A state action design, so the AI makes decisions about what action to take at a given time step.</a:t>
+            </a:r>
+            <a:endParaRPr b="0" lang="en-US" sz="1800" spc="-1" strike="noStrike">
+              <a:solidFill>
+                <a:srgbClr val="000000"/>
+              </a:solidFill>
+              <a:uFill>
+                <a:solidFill>
+                  <a:srgbClr val="ffffff"/>
+                </a:solidFill>
+              </a:uFill>
+              <a:latin typeface="Arial"/>
+            </a:endParaRPr>
+          </a:p>
+          <a:p>
+            <a:pPr marL="216000" indent="-215640">
+              <a:lnSpc>
+                <a:spcPct val="100000"/>
+              </a:lnSpc>
+              <a:buClr>
+                <a:srgbClr val="000000"/>
+              </a:buClr>
+              <a:buFont typeface="Symbol"/>
+              <a:buChar char=""/>
+            </a:pPr>
             <a:r>
               <a:rPr b="0" lang="en-US" sz="4000" spc="-1" strike="noStrike">
                 <a:solidFill>
@@ -3368,31 +3758,8 @@
                 <a:latin typeface="Trebuchet MS"/>
                 <a:ea typeface="DejaVu Sans"/>
               </a:rPr>
-              <a:t>A state action design, so the AI makes decisions about what action to take at a given time step.</a:t>
-            </a:r>
-            <a:endParaRPr b="0" lang="en-US" sz="1800" spc="-1" strike="noStrike">
-              <a:solidFill>
-                <a:srgbClr val="000000"/>
-              </a:solidFill>
-              <a:uFill>
-                <a:solidFill>
-                  <a:srgbClr val="ffffff"/>
-                </a:solidFill>
-              </a:uFill>
-              <a:latin typeface="Nimbus Sans"/>
-            </a:endParaRPr>
-          </a:p>
-          <a:p>
-            <a:pPr marL="216000" indent="-216000">
-              <a:lnSpc>
-                <a:spcPct val="100000"/>
-              </a:lnSpc>
-              <a:buClr>
-                <a:srgbClr val="000000"/>
-              </a:buClr>
-              <a:buFont typeface="Symbol" charset="2"/>
-              <a:buChar char=""/>
-            </a:pPr>
+              <a:t> </a:t>
+            </a:r>
             <a:r>
               <a:rPr b="0" lang="en-US" sz="4000" spc="-1" strike="noStrike">
                 <a:solidFill>
@@ -3406,8 +3773,31 @@
                 <a:latin typeface="Trebuchet MS"/>
                 <a:ea typeface="DejaVu Sans"/>
               </a:rPr>
-              <a:t> </a:t>
-            </a:r>
+              <a:t>Reinforcement learning to incorporate the user’s rating of the final product into the learning process</a:t>
+            </a:r>
+            <a:endParaRPr b="0" lang="en-US" sz="1800" spc="-1" strike="noStrike">
+              <a:solidFill>
+                <a:srgbClr val="000000"/>
+              </a:solidFill>
+              <a:uFill>
+                <a:solidFill>
+                  <a:srgbClr val="ffffff"/>
+                </a:solidFill>
+              </a:uFill>
+              <a:latin typeface="Arial"/>
+            </a:endParaRPr>
+          </a:p>
+          <a:p>
+            <a:pPr marL="216000" indent="-215640">
+              <a:lnSpc>
+                <a:spcPct val="100000"/>
+              </a:lnSpc>
+              <a:buClr>
+                <a:srgbClr val="000000"/>
+              </a:buClr>
+              <a:buFont typeface="Symbol"/>
+              <a:buChar char=""/>
+            </a:pPr>
             <a:r>
               <a:rPr b="0" lang="en-US" sz="4000" spc="-1" strike="noStrike">
                 <a:solidFill>
@@ -3421,31 +3811,8 @@
                 <a:latin typeface="Trebuchet MS"/>
                 <a:ea typeface="DejaVu Sans"/>
               </a:rPr>
-              <a:t>Reinforcement learning to incorporate the user’s rating of the final product into the learning process</a:t>
-            </a:r>
-            <a:endParaRPr b="0" lang="en-US" sz="1800" spc="-1" strike="noStrike">
-              <a:solidFill>
-                <a:srgbClr val="000000"/>
-              </a:solidFill>
-              <a:uFill>
-                <a:solidFill>
-                  <a:srgbClr val="ffffff"/>
-                </a:solidFill>
-              </a:uFill>
-              <a:latin typeface="Nimbus Sans"/>
-            </a:endParaRPr>
-          </a:p>
-          <a:p>
-            <a:pPr marL="216000" indent="-216000">
-              <a:lnSpc>
-                <a:spcPct val="100000"/>
-              </a:lnSpc>
-              <a:buClr>
-                <a:srgbClr val="000000"/>
-              </a:buClr>
-              <a:buFont typeface="Symbol" charset="2"/>
-              <a:buChar char=""/>
-            </a:pPr>
+              <a:t> </a:t>
+            </a:r>
             <a:r>
               <a:rPr b="0" lang="en-US" sz="4000" spc="-1" strike="noStrike">
                 <a:solidFill>
@@ -3459,8 +3826,26 @@
                 <a:latin typeface="Trebuchet MS"/>
                 <a:ea typeface="DejaVu Sans"/>
               </a:rPr>
-              <a:t> </a:t>
-            </a:r>
+              <a:t>A neural network solution, to void strict dimension issues with a static design</a:t>
+            </a:r>
+            <a:endParaRPr b="0" lang="en-US" sz="1800" spc="-1" strike="noStrike">
+              <a:solidFill>
+                <a:srgbClr val="000000"/>
+              </a:solidFill>
+              <a:uFill>
+                <a:solidFill>
+                  <a:srgbClr val="ffffff"/>
+                </a:solidFill>
+              </a:uFill>
+              <a:latin typeface="Arial"/>
+            </a:endParaRPr>
+          </a:p>
+          <a:p>
+            <a:pPr>
+              <a:lnSpc>
+                <a:spcPct val="100000"/>
+              </a:lnSpc>
+            </a:pPr>
             <a:r>
               <a:rPr b="0" lang="en-US" sz="4000" spc="-1" strike="noStrike">
                 <a:solidFill>
@@ -3474,18 +3859,18 @@
                 <a:latin typeface="Trebuchet MS"/>
                 <a:ea typeface="DejaVu Sans"/>
               </a:rPr>
-              <a:t>A neural network solution, to void strict dimension issues with a static design</a:t>
-            </a:r>
-            <a:endParaRPr b="0" lang="en-US" sz="1800" spc="-1" strike="noStrike">
-              <a:solidFill>
-                <a:srgbClr val="000000"/>
-              </a:solidFill>
-              <a:uFill>
-                <a:solidFill>
-                  <a:srgbClr val="ffffff"/>
-                </a:solidFill>
-              </a:uFill>
-              <a:latin typeface="Nimbus Sans"/>
+              <a:t>This led to a general Q-Learning agent which approximates the Q-table in the neural network.</a:t>
+            </a:r>
+            <a:endParaRPr b="0" lang="en-US" sz="1800" spc="-1" strike="noStrike">
+              <a:solidFill>
+                <a:srgbClr val="000000"/>
+              </a:solidFill>
+              <a:uFill>
+                <a:solidFill>
+                  <a:srgbClr val="ffffff"/>
+                </a:solidFill>
+              </a:uFill>
+              <a:latin typeface="Arial"/>
             </a:endParaRPr>
           </a:p>
           <a:p>
@@ -3494,63 +3879,30 @@
                 <a:spcPct val="100000"/>
               </a:lnSpc>
             </a:pPr>
-            <a:r>
-              <a:rPr b="0" lang="en-US" sz="4000" spc="-1" strike="noStrike">
-                <a:solidFill>
-                  <a:srgbClr val="000000"/>
-                </a:solidFill>
-                <a:uFill>
-                  <a:solidFill>
-                    <a:srgbClr val="ffffff"/>
-                  </a:solidFill>
-                </a:uFill>
-                <a:latin typeface="Trebuchet MS"/>
-                <a:ea typeface="DejaVu Sans"/>
-              </a:rPr>
-              <a:t>This led to a general Q-Learning agent which approximates the Q-table in the neural network.</a:t>
-            </a:r>
-            <a:endParaRPr b="0" lang="en-US" sz="1800" spc="-1" strike="noStrike">
-              <a:solidFill>
-                <a:srgbClr val="000000"/>
-              </a:solidFill>
-              <a:uFill>
-                <a:solidFill>
-                  <a:srgbClr val="ffffff"/>
-                </a:solidFill>
-              </a:uFill>
-              <a:latin typeface="Nimbus Sans"/>
-            </a:endParaRPr>
-          </a:p>
-          <a:p>
-            <a:pPr>
-              <a:lnSpc>
-                <a:spcPct val="100000"/>
-              </a:lnSpc>
-            </a:pPr>
-            <a:endParaRPr b="0" lang="en-US" sz="1800" spc="-1" strike="noStrike">
-              <a:solidFill>
-                <a:srgbClr val="000000"/>
-              </a:solidFill>
-              <a:uFill>
-                <a:solidFill>
-                  <a:srgbClr val="ffffff"/>
-                </a:solidFill>
-              </a:uFill>
-              <a:latin typeface="Nimbus Sans"/>
+            <a:endParaRPr b="0" lang="en-US" sz="1800" spc="-1" strike="noStrike">
+              <a:solidFill>
+                <a:srgbClr val="000000"/>
+              </a:solidFill>
+              <a:uFill>
+                <a:solidFill>
+                  <a:srgbClr val="ffffff"/>
+                </a:solidFill>
+              </a:uFill>
+              <a:latin typeface="Arial"/>
             </a:endParaRPr>
           </a:p>
         </p:txBody>
       </p:sp>
       <p:sp>
         <p:nvSpPr>
-          <p:cNvPr id="48" name="CustomShape 6"/>
+          <p:cNvPr id="47" name="CustomShape 6"/>
           <p:cNvSpPr/>
           <p:nvPr/>
         </p:nvSpPr>
         <p:spPr>
           <a:xfrm>
             <a:off x="982800" y="2820960"/>
-            <a:ext cx="8550000" cy="2103480"/>
+            <a:ext cx="8549640" cy="2103120"/>
           </a:xfrm>
           <a:prstGeom prst="rect">
             <a:avLst/>
@@ -3598,21 +3950,21 @@
                   <a:srgbClr val="ffffff"/>
                 </a:solidFill>
               </a:uFill>
-              <a:latin typeface="Nimbus Sans"/>
+              <a:latin typeface="Arial"/>
             </a:endParaRPr>
           </a:p>
         </p:txBody>
       </p:sp>
       <p:sp>
         <p:nvSpPr>
-          <p:cNvPr id="49" name="CustomShape 7"/>
+          <p:cNvPr id="48" name="CustomShape 7"/>
           <p:cNvSpPr/>
           <p:nvPr/>
         </p:nvSpPr>
         <p:spPr>
           <a:xfrm>
             <a:off x="32527800" y="14371560"/>
-            <a:ext cx="8551800" cy="2145960"/>
+            <a:ext cx="8551440" cy="2145600"/>
           </a:xfrm>
           <a:prstGeom prst="rect">
             <a:avLst/>
@@ -3631,14 +3983,14 @@
       </p:sp>
       <p:sp>
         <p:nvSpPr>
-          <p:cNvPr id="50" name="CustomShape 8"/>
+          <p:cNvPr id="49" name="CustomShape 8"/>
           <p:cNvSpPr/>
           <p:nvPr/>
         </p:nvSpPr>
         <p:spPr>
           <a:xfrm>
             <a:off x="32527800" y="14904720"/>
-            <a:ext cx="8551800" cy="10090800"/>
+            <a:ext cx="8551440" cy="10090440"/>
           </a:xfrm>
           <a:prstGeom prst="rect">
             <a:avLst/>
@@ -3686,11 +4038,11 @@
                   <a:srgbClr val="ffffff"/>
                 </a:solidFill>
               </a:uFill>
-              <a:latin typeface="Nimbus Sans"/>
-            </a:endParaRPr>
-          </a:p>
-          <a:p>
-            <a:pPr marL="457200" indent="-456480">
+              <a:latin typeface="Arial"/>
+            </a:endParaRPr>
+          </a:p>
+          <a:p>
+            <a:pPr marL="457200" indent="-456120">
               <a:lnSpc>
                 <a:spcPct val="100000"/>
               </a:lnSpc>
@@ -3724,11 +4076,11 @@
                   <a:srgbClr val="ffffff"/>
                 </a:solidFill>
               </a:uFill>
-              <a:latin typeface="Nimbus Sans"/>
-            </a:endParaRPr>
-          </a:p>
-          <a:p>
-            <a:pPr marL="457200" indent="-456480">
+              <a:latin typeface="Arial"/>
+            </a:endParaRPr>
+          </a:p>
+          <a:p>
+            <a:pPr marL="457200" indent="-456120">
               <a:lnSpc>
                 <a:spcPct val="100000"/>
               </a:lnSpc>
@@ -3762,11 +4114,11 @@
                   <a:srgbClr val="ffffff"/>
                 </a:solidFill>
               </a:uFill>
-              <a:latin typeface="Nimbus Sans"/>
-            </a:endParaRPr>
-          </a:p>
-          <a:p>
-            <a:pPr marL="457200" indent="-456480">
+              <a:latin typeface="Arial"/>
+            </a:endParaRPr>
+          </a:p>
+          <a:p>
+            <a:pPr marL="457200" indent="-456120">
               <a:lnSpc>
                 <a:spcPct val="100000"/>
               </a:lnSpc>
@@ -3800,11 +4152,11 @@
                   <a:srgbClr val="ffffff"/>
                 </a:solidFill>
               </a:uFill>
-              <a:latin typeface="Nimbus Sans"/>
-            </a:endParaRPr>
-          </a:p>
-          <a:p>
-            <a:pPr marL="457200" indent="-456480">
+              <a:latin typeface="Arial"/>
+            </a:endParaRPr>
+          </a:p>
+          <a:p>
+            <a:pPr marL="457200" indent="-456120">
               <a:lnSpc>
                 <a:spcPct val="100000"/>
               </a:lnSpc>
@@ -3838,7 +4190,7 @@
                   <a:srgbClr val="ffffff"/>
                 </a:solidFill>
               </a:uFill>
-              <a:latin typeface="Nimbus Sans"/>
+              <a:latin typeface="Arial"/>
             </a:endParaRPr>
           </a:p>
           <a:p>
@@ -3856,21 +4208,21 @@
                   <a:srgbClr val="ffffff"/>
                 </a:solidFill>
               </a:uFill>
-              <a:latin typeface="Nimbus Sans"/>
+              <a:latin typeface="Arial"/>
             </a:endParaRPr>
           </a:p>
         </p:txBody>
       </p:sp>
       <p:sp>
         <p:nvSpPr>
-          <p:cNvPr id="51" name="CustomShape 9"/>
+          <p:cNvPr id="50" name="CustomShape 9"/>
           <p:cNvSpPr/>
           <p:nvPr/>
         </p:nvSpPr>
         <p:spPr>
           <a:xfrm>
             <a:off x="11260440" y="5221440"/>
-            <a:ext cx="9221760" cy="7579800"/>
+            <a:ext cx="9221400" cy="7579440"/>
           </a:xfrm>
           <a:prstGeom prst="rect">
             <a:avLst/>
@@ -3931,21 +4283,21 @@
                   <a:srgbClr val="ffffff"/>
                 </a:solidFill>
               </a:uFill>
-              <a:latin typeface="Nimbus Sans"/>
+              <a:latin typeface="Arial"/>
             </a:endParaRPr>
           </a:p>
         </p:txBody>
       </p:sp>
       <p:sp>
         <p:nvSpPr>
-          <p:cNvPr id="52" name="CustomShape 10"/>
+          <p:cNvPr id="51" name="CustomShape 10"/>
           <p:cNvSpPr/>
           <p:nvPr/>
         </p:nvSpPr>
         <p:spPr>
           <a:xfrm>
             <a:off x="21227400" y="22503600"/>
-            <a:ext cx="9221760" cy="7579800"/>
+            <a:ext cx="9221400" cy="7579440"/>
           </a:xfrm>
           <a:prstGeom prst="rect">
             <a:avLst/>
@@ -4006,21 +4358,21 @@
                   <a:srgbClr val="ffffff"/>
                 </a:solidFill>
               </a:uFill>
-              <a:latin typeface="Nimbus Sans"/>
+              <a:latin typeface="Arial"/>
             </a:endParaRPr>
           </a:p>
         </p:txBody>
       </p:sp>
       <p:sp>
         <p:nvSpPr>
-          <p:cNvPr id="53" name="CustomShape 11"/>
+          <p:cNvPr id="52" name="CustomShape 11"/>
           <p:cNvSpPr/>
           <p:nvPr/>
         </p:nvSpPr>
         <p:spPr>
           <a:xfrm>
             <a:off x="32735520" y="3200400"/>
-            <a:ext cx="8229240" cy="10240920"/>
+            <a:ext cx="8228880" cy="10240560"/>
           </a:xfrm>
           <a:prstGeom prst="rect">
             <a:avLst/>
@@ -4043,14 +4395,14 @@
       </p:sp>
       <p:sp>
         <p:nvSpPr>
-          <p:cNvPr id="54" name="CustomShape 12"/>
+          <p:cNvPr id="53" name="CustomShape 12"/>
           <p:cNvSpPr/>
           <p:nvPr/>
         </p:nvSpPr>
         <p:spPr>
           <a:xfrm>
             <a:off x="33320160" y="7955280"/>
-            <a:ext cx="7223400" cy="5209200"/>
+            <a:ext cx="7223040" cy="5208840"/>
           </a:xfrm>
           <a:prstGeom prst="rect">
             <a:avLst/>
@@ -4080,6 +4432,7 @@
                   </a:solidFill>
                 </a:uFill>
                 <a:latin typeface="Arial"/>
+                <a:ea typeface="DejaVu Sans"/>
               </a:rPr>
               <a:t>TEAM MEMBERS</a:t>
             </a:r>
@@ -4092,7 +4445,7 @@
                   <a:srgbClr val="ffffff"/>
                 </a:solidFill>
               </a:uFill>
-              <a:latin typeface="Nimbus Sans"/>
+              <a:latin typeface="Arial"/>
             </a:endParaRPr>
           </a:p>
           <a:p>
@@ -4107,6 +4460,7 @@
                   </a:solidFill>
                 </a:uFill>
                 <a:latin typeface="Arial"/>
+                <a:ea typeface="DejaVu Sans"/>
               </a:rPr>
               <a:t>Cody Holliday</a:t>
             </a:r>
@@ -4119,7 +4473,7 @@
                   <a:srgbClr val="ffffff"/>
                 </a:solidFill>
               </a:uFill>
-              <a:latin typeface="Nimbus Sans"/>
+              <a:latin typeface="Arial"/>
             </a:endParaRPr>
           </a:p>
           <a:p>
@@ -4134,6 +4488,7 @@
                   </a:solidFill>
                 </a:uFill>
                 <a:latin typeface="Arial"/>
+                <a:ea typeface="DejaVu Sans"/>
               </a:rPr>
               <a:t>Aravind Parasurama</a:t>
             </a:r>
@@ -4146,7 +4501,7 @@
                   <a:srgbClr val="ffffff"/>
                 </a:solidFill>
               </a:uFill>
-              <a:latin typeface="Nimbus Sans"/>
+              <a:latin typeface="Arial"/>
             </a:endParaRPr>
           </a:p>
           <a:p>
@@ -4161,6 +4516,7 @@
                   </a:solidFill>
                 </a:uFill>
                 <a:latin typeface="Arial"/>
+                <a:ea typeface="DejaVu Sans"/>
               </a:rPr>
               <a:t>parsura</a:t>
             </a:r>
@@ -4173,7 +4529,7 @@
                   <a:srgbClr val="ffffff"/>
                 </a:solidFill>
               </a:uFill>
-              <a:latin typeface="Nimbus Sans"/>
+              <a:latin typeface="Arial"/>
             </a:endParaRPr>
           </a:p>
           <a:p>
@@ -4188,6 +4544,7 @@
                   </a:solidFill>
                 </a:uFill>
                 <a:latin typeface="Arial"/>
+                <a:ea typeface="DejaVu Sans"/>
               </a:rPr>
               <a:t>Connor Yates</a:t>
             </a:r>
@@ -4200,7 +4557,7 @@
                   <a:srgbClr val="ffffff"/>
                 </a:solidFill>
               </a:uFill>
-              <a:latin typeface="Nimbus Sans"/>
+              <a:latin typeface="Arial"/>
             </a:endParaRPr>
           </a:p>
           <a:p>
@@ -4215,6 +4572,7 @@
                   </a:solidFill>
                 </a:uFill>
                 <a:latin typeface="Arial"/>
+                <a:ea typeface="DejaVu Sans"/>
               </a:rPr>
               <a:t>yatesco@oregonstate.edu</a:t>
             </a:r>
@@ -4227,20 +4585,20 @@
                   <a:srgbClr val="ffffff"/>
                 </a:solidFill>
               </a:uFill>
-              <a:latin typeface="Nimbus Sans"/>
-            </a:endParaRPr>
-          </a:p>
-          <a:p>
-            <a:endParaRPr b="0" lang="en-US" sz="1800" spc="-1" strike="noStrike">
-              <a:solidFill>
-                <a:srgbClr val="000000"/>
-              </a:solidFill>
-              <a:uFill>
-                <a:solidFill>
-                  <a:srgbClr val="ffffff"/>
-                </a:solidFill>
-              </a:uFill>
-              <a:latin typeface="Nimbus Sans"/>
+              <a:latin typeface="Arial"/>
+            </a:endParaRPr>
+          </a:p>
+          <a:p>
+            <a:endParaRPr b="0" lang="en-US" sz="1800" spc="-1" strike="noStrike">
+              <a:solidFill>
+                <a:srgbClr val="000000"/>
+              </a:solidFill>
+              <a:uFill>
+                <a:solidFill>
+                  <a:srgbClr val="ffffff"/>
+                </a:solidFill>
+              </a:uFill>
+              <a:latin typeface="Arial"/>
             </a:endParaRPr>
           </a:p>
           <a:p>
@@ -4255,6 +4613,7 @@
                   </a:solidFill>
                 </a:uFill>
                 <a:latin typeface="Arial"/>
+                <a:ea typeface="DejaVu Sans"/>
               </a:rPr>
               <a:t>PROJECT MENTOR</a:t>
             </a:r>
@@ -4267,7 +4626,7 @@
                   <a:srgbClr val="ffffff"/>
                 </a:solidFill>
               </a:uFill>
-              <a:latin typeface="Nimbus Sans"/>
+              <a:latin typeface="Arial"/>
             </a:endParaRPr>
           </a:p>
           <a:p>
@@ -4282,6 +4641,7 @@
                   </a:solidFill>
                 </a:uFill>
                 <a:latin typeface="Arial"/>
+                <a:ea typeface="DejaVu Sans"/>
               </a:rPr>
               <a:t>Dale McCauley</a:t>
             </a:r>
@@ -4294,20 +4654,20 @@
                   <a:srgbClr val="ffffff"/>
                 </a:solidFill>
               </a:uFill>
-              <a:latin typeface="Nimbus Sans"/>
-            </a:endParaRPr>
-          </a:p>
-          <a:p>
-            <a:endParaRPr b="0" lang="en-US" sz="1800" spc="-1" strike="noStrike">
-              <a:solidFill>
-                <a:srgbClr val="000000"/>
-              </a:solidFill>
-              <a:uFill>
-                <a:solidFill>
-                  <a:srgbClr val="ffffff"/>
-                </a:solidFill>
-              </a:uFill>
-              <a:latin typeface="Nimbus Sans"/>
+              <a:latin typeface="Arial"/>
+            </a:endParaRPr>
+          </a:p>
+          <a:p>
+            <a:endParaRPr b="0" lang="en-US" sz="1800" spc="-1" strike="noStrike">
+              <a:solidFill>
+                <a:srgbClr val="000000"/>
+              </a:solidFill>
+              <a:uFill>
+                <a:solidFill>
+                  <a:srgbClr val="ffffff"/>
+                </a:solidFill>
+              </a:uFill>
+              <a:latin typeface="Arial"/>
             </a:endParaRPr>
           </a:p>
           <a:p>
@@ -4322,6 +4682,7 @@
                   </a:solidFill>
                 </a:uFill>
                 <a:latin typeface="Arial"/>
+                <a:ea typeface="DejaVu Sans"/>
               </a:rPr>
               <a:t>SPONSOR</a:t>
             </a:r>
@@ -4334,7 +4695,7 @@
                   <a:srgbClr val="ffffff"/>
                 </a:solidFill>
               </a:uFill>
-              <a:latin typeface="Nimbus Sans"/>
+              <a:latin typeface="Arial"/>
             </a:endParaRPr>
           </a:p>
           <a:p>
@@ -4349,6 +4710,7 @@
                   </a:solidFill>
                 </a:uFill>
                 <a:latin typeface="Arial"/>
+                <a:ea typeface="DejaVu Sans"/>
               </a:rPr>
               <a:t>College of Business InnovationX</a:t>
             </a:r>
@@ -4361,21 +4723,21 @@
                   <a:srgbClr val="ffffff"/>
                 </a:solidFill>
               </a:uFill>
-              <a:latin typeface="Nimbus Sans"/>
+              <a:latin typeface="Arial"/>
             </a:endParaRPr>
           </a:p>
         </p:txBody>
       </p:sp>
       <p:sp>
         <p:nvSpPr>
-          <p:cNvPr id="55" name="CustomShape 13"/>
+          <p:cNvPr id="54" name="CustomShape 13"/>
           <p:cNvSpPr/>
           <p:nvPr/>
         </p:nvSpPr>
         <p:spPr>
           <a:xfrm>
             <a:off x="33375600" y="5088240"/>
-            <a:ext cx="6949080" cy="855000"/>
+            <a:ext cx="6948720" cy="854640"/>
           </a:xfrm>
           <a:prstGeom prst="rect">
             <a:avLst/>
@@ -4405,6 +4767,7 @@
                   </a:solidFill>
                 </a:uFill>
                 <a:latin typeface="Arial"/>
+                <a:ea typeface="DejaVu Sans"/>
               </a:rPr>
               <a:t>TEAM PICTURE</a:t>
             </a:r>
@@ -4417,14 +4780,14 @@
                   <a:srgbClr val="ffffff"/>
                 </a:solidFill>
               </a:uFill>
-              <a:latin typeface="Nimbus Sans"/>
+              <a:latin typeface="Arial"/>
             </a:endParaRPr>
           </a:p>
         </p:txBody>
       </p:sp>
       <p:pic>
         <p:nvPicPr>
-          <p:cNvPr id="56" name="" descr=""/>
+          <p:cNvPr id="55" name="" descr=""/>
           <p:cNvPicPr/>
           <p:nvPr/>
         </p:nvPicPr>
@@ -4435,7 +4798,7 @@
         <p:spPr>
           <a:xfrm>
             <a:off x="279000" y="10515600"/>
-            <a:ext cx="10236600" cy="7680960"/>
+            <a:ext cx="10236240" cy="7680600"/>
           </a:xfrm>
           <a:prstGeom prst="rect">
             <a:avLst/>
@@ -4447,14 +4810,14 @@
       </p:pic>
       <p:sp>
         <p:nvSpPr>
-          <p:cNvPr id="57" name="TextShape 14"/>
-          <p:cNvSpPr txBox="1"/>
+          <p:cNvPr id="56" name="CustomShape 14"/>
+          <p:cNvSpPr/>
           <p:nvPr/>
         </p:nvSpPr>
         <p:spPr>
           <a:xfrm>
             <a:off x="1005840" y="18430920"/>
-            <a:ext cx="8778240" cy="1228680"/>
+            <a:ext cx="8777880" cy="1228320"/>
           </a:xfrm>
           <a:prstGeom prst="rect">
             <a:avLst/>
@@ -4464,6 +4827,12 @@
             <a:noFill/>
           </a:ln>
         </p:spPr>
+        <p:style>
+          <a:lnRef idx="0"/>
+          <a:fillRef idx="0"/>
+          <a:effectRef idx="0"/>
+          <a:fontRef idx="minor"/>
+        </p:style>
         <p:txBody>
           <a:bodyPr lIns="90000" rIns="90000" tIns="45000" bIns="45000"/>
           <a:p>
@@ -4481,16 +4850,16 @@
               </a:rPr>
               <a:t>Figure 1: A flowchart providing a high-level description on how the user feedback is incorporated into the decision-making process.</a:t>
             </a:r>
-            <a:endParaRPr b="0" lang="en-US" sz="3000" spc="-1" strike="noStrike">
-              <a:solidFill>
-                <a:srgbClr val="000000"/>
-              </a:solidFill>
-              <a:uFill>
-                <a:solidFill>
-                  <a:srgbClr val="ffffff"/>
-                </a:solidFill>
-              </a:uFill>
-              <a:latin typeface="Nimbus Sans"/>
+            <a:endParaRPr b="0" lang="en-US" sz="1800" spc="-1" strike="noStrike">
+              <a:solidFill>
+                <a:srgbClr val="000000"/>
+              </a:solidFill>
+              <a:uFill>
+                <a:solidFill>
+                  <a:srgbClr val="ffffff"/>
+                </a:solidFill>
+              </a:uFill>
+              <a:latin typeface="Arial"/>
             </a:endParaRPr>
           </a:p>
         </p:txBody>

</xml_diff>

<commit_message>
Dale fixed some spelling and formatting.
</commit_message>
<xml_diff>
--- a/docs/expo_poster/ResearchShowcasePoster_EECS_2017.pptx
+++ b/docs/expo_poster/ResearchShowcasePoster_EECS_2017.pptx
@@ -34,7 +34,7 @@
       </p:grpSpPr>
       <p:sp>
         <p:nvSpPr>
-          <p:cNvPr id="37" name="PlaceHolder 1"/>
+          <p:cNvPr id="35" name="PlaceHolder 1"/>
           <p:cNvSpPr>
             <a:spLocks noGrp="1"/>
           </p:cNvSpPr>
@@ -84,7 +84,7 @@
       </p:sp>
       <p:sp>
         <p:nvSpPr>
-          <p:cNvPr id="38" name="PlaceHolder 2"/>
+          <p:cNvPr id="36" name="PlaceHolder 2"/>
           <p:cNvSpPr>
             <a:spLocks noGrp="1"/>
           </p:cNvSpPr>
@@ -116,7 +116,7 @@
                 </a:uFill>
                 <a:latin typeface="Times New Roman"/>
               </a:rPr>
-              <a:t> </a:t>
+              <a:t>&lt;header&gt;</a:t>
             </a:r>
             <a:endParaRPr b="0" lang="en-US" sz="1400" spc="-1" strike="noStrike">
               <a:solidFill>
@@ -134,7 +134,7 @@
       </p:sp>
       <p:sp>
         <p:nvSpPr>
-          <p:cNvPr id="39" name="PlaceHolder 3"/>
+          <p:cNvPr id="37" name="PlaceHolder 3"/>
           <p:cNvSpPr>
             <a:spLocks noGrp="1"/>
           </p:cNvSpPr>
@@ -167,7 +167,7 @@
                 </a:uFill>
                 <a:latin typeface="Times New Roman"/>
               </a:rPr>
-              <a:t> </a:t>
+              <a:t>&lt;date/time&gt;</a:t>
             </a:r>
             <a:endParaRPr b="0" lang="en-US" sz="1400" spc="-1" strike="noStrike">
               <a:solidFill>
@@ -185,7 +185,7 @@
       </p:sp>
       <p:sp>
         <p:nvSpPr>
-          <p:cNvPr id="40" name="PlaceHolder 4"/>
+          <p:cNvPr id="38" name="PlaceHolder 4"/>
           <p:cNvSpPr>
             <a:spLocks noGrp="1"/>
           </p:cNvSpPr>
@@ -217,7 +217,7 @@
                 </a:uFill>
                 <a:latin typeface="Times New Roman"/>
               </a:rPr>
-              <a:t> </a:t>
+              <a:t>&lt;footer&gt;</a:t>
             </a:r>
             <a:endParaRPr b="0" lang="en-US" sz="1400" spc="-1" strike="noStrike">
               <a:solidFill>
@@ -235,7 +235,7 @@
       </p:sp>
       <p:sp>
         <p:nvSpPr>
-          <p:cNvPr id="41" name="PlaceHolder 5"/>
+          <p:cNvPr id="39" name="PlaceHolder 5"/>
           <p:cNvSpPr>
             <a:spLocks noGrp="1"/>
           </p:cNvSpPr>
@@ -256,7 +256,7 @@
           <a:bodyPr lIns="0" rIns="0" tIns="0" bIns="0" anchor="b"/>
           <a:p>
             <a:pPr algn="r"/>
-            <a:fld id="{364CF29C-95F4-401C-ADDA-54B59962B006}" type="slidenum">
+            <a:fld id="{61897F4A-B468-473E-98F0-31073A2792AE}" type="slidenum">
               <a:rPr b="0" lang="en-US" sz="1400" spc="-1" strike="noStrike">
                 <a:solidFill>
                   <a:srgbClr val="000000"/>
@@ -268,7 +268,7 @@
                 </a:uFill>
                 <a:latin typeface="Times New Roman"/>
               </a:rPr>
-              <a:t>1</a:t>
+              <a:t>&lt;number&gt;</a:t>
             </a:fld>
             <a:endParaRPr b="0" lang="en-US" sz="1400" spc="-1" strike="noStrike">
               <a:solidFill>
@@ -309,7 +309,7 @@
       </p:grpSpPr>
       <p:sp>
         <p:nvSpPr>
-          <p:cNvPr id="57" name="PlaceHolder 1"/>
+          <p:cNvPr id="55" name="PlaceHolder 1"/>
           <p:cNvSpPr>
             <a:spLocks noGrp="1"/>
           </p:cNvSpPr>
@@ -320,7 +320,7 @@
         <p:spPr>
           <a:xfrm>
             <a:off x="685800" y="4343400"/>
-            <a:ext cx="5485320" cy="4113720"/>
+            <a:ext cx="5484960" cy="4113360"/>
           </a:xfrm>
           <a:prstGeom prst="rect">
             <a:avLst/>
@@ -345,14 +345,14 @@
       </p:sp>
       <p:sp>
         <p:nvSpPr>
-          <p:cNvPr id="58" name="CustomShape 2"/>
+          <p:cNvPr id="56" name="CustomShape 2"/>
           <p:cNvSpPr/>
           <p:nvPr/>
         </p:nvSpPr>
         <p:spPr>
           <a:xfrm>
             <a:off x="3884760" y="8685360"/>
-            <a:ext cx="2970720" cy="456120"/>
+            <a:ext cx="2970360" cy="455760"/>
           </a:xfrm>
           <a:prstGeom prst="rect">
             <a:avLst/>
@@ -376,7 +376,7 @@
                 <a:spcPct val="100000"/>
               </a:lnSpc>
             </a:pPr>
-            <a:fld id="{561CC6EF-1F79-4EF8-9AB6-A2AEE090934D}" type="slidenum">
+            <a:fld id="{196FEED4-2DE0-4417-84B7-02963F22F5D8}" type="slidenum">
               <a:rPr b="0" lang="en-US" sz="1200" spc="-1" strike="noStrike">
                 <a:solidFill>
                   <a:srgbClr val="000000"/>
@@ -451,7 +451,7 @@
       </p:grpSpPr>
       <p:sp>
         <p:nvSpPr>
-          <p:cNvPr id="24" name="PlaceHolder 1"/>
+          <p:cNvPr id="22" name="PlaceHolder 1"/>
           <p:cNvSpPr>
             <a:spLocks noGrp="1"/>
           </p:cNvSpPr>
@@ -461,8 +461,8 @@
         </p:nvSpPr>
         <p:spPr>
           <a:xfrm>
-            <a:off x="3154680" y="10083960"/>
-            <a:ext cx="35751960" cy="6957000"/>
+            <a:off x="2103120" y="1294920"/>
+            <a:ext cx="37855800" cy="5420520"/>
           </a:xfrm>
           <a:prstGeom prst="rect">
             <a:avLst/>
@@ -488,7 +488,7 @@
       </p:sp>
       <p:sp>
         <p:nvSpPr>
-          <p:cNvPr id="25" name="PlaceHolder 2"/>
+          <p:cNvPr id="23" name="PlaceHolder 2"/>
           <p:cNvSpPr>
             <a:spLocks noGrp="1"/>
           </p:cNvSpPr>
@@ -499,7 +499,7 @@
         <p:spPr>
           <a:xfrm>
             <a:off x="2103120" y="7595640"/>
-            <a:ext cx="37855440" cy="8980200"/>
+            <a:ext cx="37855800" cy="8980200"/>
           </a:xfrm>
           <a:prstGeom prst="rect">
             <a:avLst/>
@@ -524,7 +524,7 @@
       </p:sp>
       <p:sp>
         <p:nvSpPr>
-          <p:cNvPr id="26" name="PlaceHolder 3"/>
+          <p:cNvPr id="24" name="PlaceHolder 3"/>
           <p:cNvSpPr>
             <a:spLocks noGrp="1"/>
           </p:cNvSpPr>
@@ -535,7 +535,7 @@
         <p:spPr>
           <a:xfrm>
             <a:off x="2103120" y="17429400"/>
-            <a:ext cx="37855440" cy="8980200"/>
+            <a:ext cx="37855800" cy="8980200"/>
           </a:xfrm>
           <a:prstGeom prst="rect">
             <a:avLst/>
@@ -582,7 +582,7 @@
       </p:grpSpPr>
       <p:sp>
         <p:nvSpPr>
-          <p:cNvPr id="27" name="PlaceHolder 1"/>
+          <p:cNvPr id="25" name="PlaceHolder 1"/>
           <p:cNvSpPr>
             <a:spLocks noGrp="1"/>
           </p:cNvSpPr>
@@ -592,8 +592,8 @@
         </p:nvSpPr>
         <p:spPr>
           <a:xfrm>
-            <a:off x="3154680" y="10083960"/>
-            <a:ext cx="35751960" cy="6957000"/>
+            <a:off x="2103120" y="1294920"/>
+            <a:ext cx="37855800" cy="5420520"/>
           </a:xfrm>
           <a:prstGeom prst="rect">
             <a:avLst/>
@@ -619,7 +619,7 @@
       </p:sp>
       <p:sp>
         <p:nvSpPr>
-          <p:cNvPr id="28" name="PlaceHolder 2"/>
+          <p:cNvPr id="26" name="PlaceHolder 2"/>
           <p:cNvSpPr>
             <a:spLocks noGrp="1"/>
           </p:cNvSpPr>
@@ -655,7 +655,7 @@
       </p:sp>
       <p:sp>
         <p:nvSpPr>
-          <p:cNvPr id="29" name="PlaceHolder 3"/>
+          <p:cNvPr id="27" name="PlaceHolder 3"/>
           <p:cNvSpPr>
             <a:spLocks noGrp="1"/>
           </p:cNvSpPr>
@@ -691,7 +691,7 @@
       </p:sp>
       <p:sp>
         <p:nvSpPr>
-          <p:cNvPr id="30" name="PlaceHolder 4"/>
+          <p:cNvPr id="28" name="PlaceHolder 4"/>
           <p:cNvSpPr>
             <a:spLocks noGrp="1"/>
           </p:cNvSpPr>
@@ -727,7 +727,7 @@
       </p:sp>
       <p:sp>
         <p:nvSpPr>
-          <p:cNvPr id="31" name="PlaceHolder 5"/>
+          <p:cNvPr id="29" name="PlaceHolder 5"/>
           <p:cNvSpPr>
             <a:spLocks noGrp="1"/>
           </p:cNvSpPr>
@@ -785,7 +785,7 @@
       </p:grpSpPr>
       <p:sp>
         <p:nvSpPr>
-          <p:cNvPr id="32" name="PlaceHolder 1"/>
+          <p:cNvPr id="30" name="PlaceHolder 1"/>
           <p:cNvSpPr>
             <a:spLocks noGrp="1"/>
           </p:cNvSpPr>
@@ -795,8 +795,8 @@
         </p:nvSpPr>
         <p:spPr>
           <a:xfrm>
-            <a:off x="3154680" y="10083960"/>
-            <a:ext cx="35751960" cy="6957000"/>
+            <a:off x="2103120" y="1294920"/>
+            <a:ext cx="37855800" cy="5420520"/>
           </a:xfrm>
           <a:prstGeom prst="rect">
             <a:avLst/>
@@ -822,7 +822,7 @@
       </p:sp>
       <p:sp>
         <p:nvSpPr>
-          <p:cNvPr id="33" name="PlaceHolder 2"/>
+          <p:cNvPr id="31" name="PlaceHolder 2"/>
           <p:cNvSpPr>
             <a:spLocks noGrp="1"/>
           </p:cNvSpPr>
@@ -833,7 +833,7 @@
         <p:spPr>
           <a:xfrm>
             <a:off x="2103120" y="7595640"/>
-            <a:ext cx="37855440" cy="18826560"/>
+            <a:ext cx="37855800" cy="18826920"/>
           </a:xfrm>
           <a:prstGeom prst="rect">
             <a:avLst/>
@@ -858,7 +858,7 @@
       </p:sp>
       <p:sp>
         <p:nvSpPr>
-          <p:cNvPr id="34" name="PlaceHolder 3"/>
+          <p:cNvPr id="32" name="PlaceHolder 3"/>
           <p:cNvSpPr>
             <a:spLocks noGrp="1"/>
           </p:cNvSpPr>
@@ -869,7 +869,7 @@
         <p:spPr>
           <a:xfrm>
             <a:off x="2103120" y="7595640"/>
-            <a:ext cx="37855440" cy="18826560"/>
+            <a:ext cx="37855800" cy="18826920"/>
           </a:xfrm>
           <a:prstGeom prst="rect">
             <a:avLst/>
@@ -894,7 +894,7 @@
       </p:sp>
       <p:pic>
         <p:nvPicPr>
-          <p:cNvPr id="35" name="" descr=""/>
+          <p:cNvPr id="33" name="" descr=""/>
           <p:cNvPicPr/>
           <p:nvPr/>
         </p:nvPicPr>
@@ -904,8 +904,8 @@
         </p:blipFill>
         <p:spPr>
           <a:xfrm>
-            <a:off x="9232920" y="7595640"/>
-            <a:ext cx="23595840" cy="18826560"/>
+            <a:off x="9232560" y="7595280"/>
+            <a:ext cx="23596200" cy="18826920"/>
           </a:xfrm>
           <a:prstGeom prst="rect">
             <a:avLst/>
@@ -917,7 +917,7 @@
       </p:pic>
       <p:pic>
         <p:nvPicPr>
-          <p:cNvPr id="36" name="" descr=""/>
+          <p:cNvPr id="34" name="" descr=""/>
           <p:cNvPicPr/>
           <p:nvPr/>
         </p:nvPicPr>
@@ -927,8 +927,8 @@
         </p:blipFill>
         <p:spPr>
           <a:xfrm>
-            <a:off x="9232920" y="7595640"/>
-            <a:ext cx="23595840" cy="18826560"/>
+            <a:off x="9232560" y="7595280"/>
+            <a:ext cx="23596200" cy="18826920"/>
           </a:xfrm>
           <a:prstGeom prst="rect">
             <a:avLst/>
@@ -962,7 +962,7 @@
       </p:grpSpPr>
       <p:sp>
         <p:nvSpPr>
-          <p:cNvPr id="3" name="PlaceHolder 1"/>
+          <p:cNvPr id="1" name="PlaceHolder 1"/>
           <p:cNvSpPr>
             <a:spLocks noGrp="1"/>
           </p:cNvSpPr>
@@ -972,8 +972,8 @@
         </p:nvSpPr>
         <p:spPr>
           <a:xfrm>
-            <a:off x="3154680" y="10083960"/>
-            <a:ext cx="35751960" cy="6957000"/>
+            <a:off x="2103120" y="1294920"/>
+            <a:ext cx="37855800" cy="5420520"/>
           </a:xfrm>
           <a:prstGeom prst="rect">
             <a:avLst/>
@@ -999,7 +999,7 @@
       </p:sp>
       <p:sp>
         <p:nvSpPr>
-          <p:cNvPr id="4" name="PlaceHolder 2"/>
+          <p:cNvPr id="2" name="PlaceHolder 2"/>
           <p:cNvSpPr>
             <a:spLocks noGrp="1"/>
           </p:cNvSpPr>
@@ -1010,7 +1010,7 @@
         <p:spPr>
           <a:xfrm>
             <a:off x="2103120" y="7595640"/>
-            <a:ext cx="37855440" cy="18826560"/>
+            <a:ext cx="37855800" cy="18826920"/>
           </a:xfrm>
           <a:prstGeom prst="rect">
             <a:avLst/>
@@ -1058,7 +1058,7 @@
       </p:grpSpPr>
       <p:sp>
         <p:nvSpPr>
-          <p:cNvPr id="5" name="PlaceHolder 1"/>
+          <p:cNvPr id="3" name="PlaceHolder 1"/>
           <p:cNvSpPr>
             <a:spLocks noGrp="1"/>
           </p:cNvSpPr>
@@ -1068,8 +1068,8 @@
         </p:nvSpPr>
         <p:spPr>
           <a:xfrm>
-            <a:off x="3154680" y="10083960"/>
-            <a:ext cx="35751960" cy="6957000"/>
+            <a:off x="2103120" y="1294920"/>
+            <a:ext cx="37855800" cy="5420520"/>
           </a:xfrm>
           <a:prstGeom prst="rect">
             <a:avLst/>
@@ -1095,7 +1095,7 @@
       </p:sp>
       <p:sp>
         <p:nvSpPr>
-          <p:cNvPr id="6" name="PlaceHolder 2"/>
+          <p:cNvPr id="4" name="PlaceHolder 2"/>
           <p:cNvSpPr>
             <a:spLocks noGrp="1"/>
           </p:cNvSpPr>
@@ -1106,7 +1106,7 @@
         <p:spPr>
           <a:xfrm>
             <a:off x="2103120" y="7595640"/>
-            <a:ext cx="37855440" cy="18826560"/>
+            <a:ext cx="37855800" cy="18826920"/>
           </a:xfrm>
           <a:prstGeom prst="rect">
             <a:avLst/>
@@ -1153,7 +1153,7 @@
       </p:grpSpPr>
       <p:sp>
         <p:nvSpPr>
-          <p:cNvPr id="7" name="PlaceHolder 1"/>
+          <p:cNvPr id="5" name="PlaceHolder 1"/>
           <p:cNvSpPr>
             <a:spLocks noGrp="1"/>
           </p:cNvSpPr>
@@ -1163,8 +1163,8 @@
         </p:nvSpPr>
         <p:spPr>
           <a:xfrm>
-            <a:off x="3154680" y="10083960"/>
-            <a:ext cx="35751960" cy="6957000"/>
+            <a:off x="2103120" y="1294920"/>
+            <a:ext cx="37855800" cy="5420520"/>
           </a:xfrm>
           <a:prstGeom prst="rect">
             <a:avLst/>
@@ -1190,7 +1190,7 @@
       </p:sp>
       <p:sp>
         <p:nvSpPr>
-          <p:cNvPr id="8" name="PlaceHolder 2"/>
+          <p:cNvPr id="6" name="PlaceHolder 2"/>
           <p:cNvSpPr>
             <a:spLocks noGrp="1"/>
           </p:cNvSpPr>
@@ -1201,7 +1201,7 @@
         <p:spPr>
           <a:xfrm>
             <a:off x="2103120" y="7595640"/>
-            <a:ext cx="18473400" cy="18826560"/>
+            <a:ext cx="18473400" cy="18826920"/>
           </a:xfrm>
           <a:prstGeom prst="rect">
             <a:avLst/>
@@ -1226,7 +1226,7 @@
       </p:sp>
       <p:sp>
         <p:nvSpPr>
-          <p:cNvPr id="9" name="PlaceHolder 3"/>
+          <p:cNvPr id="7" name="PlaceHolder 3"/>
           <p:cNvSpPr>
             <a:spLocks noGrp="1"/>
           </p:cNvSpPr>
@@ -1237,7 +1237,7 @@
         <p:spPr>
           <a:xfrm>
             <a:off x="21500640" y="7595640"/>
-            <a:ext cx="18473400" cy="18826560"/>
+            <a:ext cx="18473400" cy="18826920"/>
           </a:xfrm>
           <a:prstGeom prst="rect">
             <a:avLst/>
@@ -1284,7 +1284,7 @@
       </p:grpSpPr>
       <p:sp>
         <p:nvSpPr>
-          <p:cNvPr id="10" name="PlaceHolder 1"/>
+          <p:cNvPr id="8" name="PlaceHolder 1"/>
           <p:cNvSpPr>
             <a:spLocks noGrp="1"/>
           </p:cNvSpPr>
@@ -1294,8 +1294,8 @@
         </p:nvSpPr>
         <p:spPr>
           <a:xfrm>
-            <a:off x="3154680" y="10083960"/>
-            <a:ext cx="35751960" cy="6957000"/>
+            <a:off x="2103120" y="1294920"/>
+            <a:ext cx="37855800" cy="5420520"/>
           </a:xfrm>
           <a:prstGeom prst="rect">
             <a:avLst/>
@@ -1343,7 +1343,7 @@
       </p:grpSpPr>
       <p:sp>
         <p:nvSpPr>
-          <p:cNvPr id="11" name="PlaceHolder 1"/>
+          <p:cNvPr id="9" name="PlaceHolder 1"/>
           <p:cNvSpPr>
             <a:spLocks noGrp="1"/>
           </p:cNvSpPr>
@@ -1353,8 +1353,8 @@
         </p:nvSpPr>
         <p:spPr>
           <a:xfrm>
-            <a:off x="3154680" y="10083960"/>
-            <a:ext cx="35751960" cy="32249880"/>
+            <a:off x="2103120" y="1294920"/>
+            <a:ext cx="37855800" cy="25127640"/>
           </a:xfrm>
           <a:prstGeom prst="rect">
             <a:avLst/>
@@ -1402,7 +1402,7 @@
       </p:grpSpPr>
       <p:sp>
         <p:nvSpPr>
-          <p:cNvPr id="12" name="PlaceHolder 1"/>
+          <p:cNvPr id="10" name="PlaceHolder 1"/>
           <p:cNvSpPr>
             <a:spLocks noGrp="1"/>
           </p:cNvSpPr>
@@ -1412,8 +1412,8 @@
         </p:nvSpPr>
         <p:spPr>
           <a:xfrm>
-            <a:off x="3154680" y="10083960"/>
-            <a:ext cx="35751960" cy="6957000"/>
+            <a:off x="2103120" y="1294920"/>
+            <a:ext cx="37855800" cy="5420520"/>
           </a:xfrm>
           <a:prstGeom prst="rect">
             <a:avLst/>
@@ -1439,7 +1439,7 @@
       </p:sp>
       <p:sp>
         <p:nvSpPr>
-          <p:cNvPr id="13" name="PlaceHolder 2"/>
+          <p:cNvPr id="11" name="PlaceHolder 2"/>
           <p:cNvSpPr>
             <a:spLocks noGrp="1"/>
           </p:cNvSpPr>
@@ -1475,7 +1475,7 @@
       </p:sp>
       <p:sp>
         <p:nvSpPr>
-          <p:cNvPr id="14" name="PlaceHolder 3"/>
+          <p:cNvPr id="12" name="PlaceHolder 3"/>
           <p:cNvSpPr>
             <a:spLocks noGrp="1"/>
           </p:cNvSpPr>
@@ -1511,7 +1511,7 @@
       </p:sp>
       <p:sp>
         <p:nvSpPr>
-          <p:cNvPr id="15" name="PlaceHolder 4"/>
+          <p:cNvPr id="13" name="PlaceHolder 4"/>
           <p:cNvSpPr>
             <a:spLocks noGrp="1"/>
           </p:cNvSpPr>
@@ -1522,7 +1522,7 @@
         <p:spPr>
           <a:xfrm>
             <a:off x="21500640" y="7595640"/>
-            <a:ext cx="18473400" cy="18826560"/>
+            <a:ext cx="18473400" cy="18826920"/>
           </a:xfrm>
           <a:prstGeom prst="rect">
             <a:avLst/>
@@ -1569,7 +1569,7 @@
       </p:grpSpPr>
       <p:sp>
         <p:nvSpPr>
-          <p:cNvPr id="16" name="PlaceHolder 1"/>
+          <p:cNvPr id="14" name="PlaceHolder 1"/>
           <p:cNvSpPr>
             <a:spLocks noGrp="1"/>
           </p:cNvSpPr>
@@ -1579,8 +1579,8 @@
         </p:nvSpPr>
         <p:spPr>
           <a:xfrm>
-            <a:off x="3154680" y="10083960"/>
-            <a:ext cx="35751960" cy="6957000"/>
+            <a:off x="2103120" y="1294920"/>
+            <a:ext cx="37855800" cy="5420520"/>
           </a:xfrm>
           <a:prstGeom prst="rect">
             <a:avLst/>
@@ -1606,7 +1606,7 @@
       </p:sp>
       <p:sp>
         <p:nvSpPr>
-          <p:cNvPr id="17" name="PlaceHolder 2"/>
+          <p:cNvPr id="15" name="PlaceHolder 2"/>
           <p:cNvSpPr>
             <a:spLocks noGrp="1"/>
           </p:cNvSpPr>
@@ -1617,7 +1617,7 @@
         <p:spPr>
           <a:xfrm>
             <a:off x="2103120" y="7595640"/>
-            <a:ext cx="18473400" cy="18826560"/>
+            <a:ext cx="18473400" cy="18826920"/>
           </a:xfrm>
           <a:prstGeom prst="rect">
             <a:avLst/>
@@ -1642,7 +1642,7 @@
       </p:sp>
       <p:sp>
         <p:nvSpPr>
-          <p:cNvPr id="18" name="PlaceHolder 3"/>
+          <p:cNvPr id="16" name="PlaceHolder 3"/>
           <p:cNvSpPr>
             <a:spLocks noGrp="1"/>
           </p:cNvSpPr>
@@ -1678,7 +1678,7 @@
       </p:sp>
       <p:sp>
         <p:nvSpPr>
-          <p:cNvPr id="19" name="PlaceHolder 4"/>
+          <p:cNvPr id="17" name="PlaceHolder 4"/>
           <p:cNvSpPr>
             <a:spLocks noGrp="1"/>
           </p:cNvSpPr>
@@ -1736,7 +1736,7 @@
       </p:grpSpPr>
       <p:sp>
         <p:nvSpPr>
-          <p:cNvPr id="20" name="PlaceHolder 1"/>
+          <p:cNvPr id="18" name="PlaceHolder 1"/>
           <p:cNvSpPr>
             <a:spLocks noGrp="1"/>
           </p:cNvSpPr>
@@ -1746,8 +1746,8 @@
         </p:nvSpPr>
         <p:spPr>
           <a:xfrm>
-            <a:off x="3154680" y="10083960"/>
-            <a:ext cx="35751960" cy="6957000"/>
+            <a:off x="2103120" y="1294920"/>
+            <a:ext cx="37855800" cy="5420520"/>
           </a:xfrm>
           <a:prstGeom prst="rect">
             <a:avLst/>
@@ -1773,7 +1773,7 @@
       </p:sp>
       <p:sp>
         <p:nvSpPr>
-          <p:cNvPr id="21" name="PlaceHolder 2"/>
+          <p:cNvPr id="19" name="PlaceHolder 2"/>
           <p:cNvSpPr>
             <a:spLocks noGrp="1"/>
           </p:cNvSpPr>
@@ -1809,7 +1809,7 @@
       </p:sp>
       <p:sp>
         <p:nvSpPr>
-          <p:cNvPr id="22" name="PlaceHolder 3"/>
+          <p:cNvPr id="20" name="PlaceHolder 3"/>
           <p:cNvSpPr>
             <a:spLocks noGrp="1"/>
           </p:cNvSpPr>
@@ -1845,7 +1845,7 @@
       </p:sp>
       <p:sp>
         <p:nvSpPr>
-          <p:cNvPr id="23" name="PlaceHolder 4"/>
+          <p:cNvPr id="21" name="PlaceHolder 4"/>
           <p:cNvSpPr>
             <a:spLocks noGrp="1"/>
           </p:cNvSpPr>
@@ -1856,7 +1856,7 @@
         <p:spPr>
           <a:xfrm>
             <a:off x="2103120" y="17429400"/>
-            <a:ext cx="37855440" cy="8980200"/>
+            <a:ext cx="37855800" cy="8980200"/>
           </a:xfrm>
           <a:prstGeom prst="rect">
             <a:avLst/>
@@ -1921,7 +1921,7 @@
         <p:spPr>
           <a:xfrm>
             <a:off x="0" y="0"/>
-            <a:ext cx="42061320" cy="32460120"/>
+            <a:ext cx="42060960" cy="32459760"/>
           </a:xfrm>
           <a:prstGeom prst="rect">
             <a:avLst/>
@@ -1931,311 +1931,6 @@
           </a:ln>
         </p:spPr>
       </p:pic>
-      <p:sp>
-        <p:nvSpPr>
-          <p:cNvPr id="1" name="PlaceHolder 1"/>
-          <p:cNvSpPr>
-            <a:spLocks noGrp="1"/>
-          </p:cNvSpPr>
-          <p:nvPr>
-            <p:ph type="title"/>
-          </p:nvPr>
-        </p:nvSpPr>
-        <p:spPr>
-          <a:xfrm>
-            <a:off x="3154680" y="10083960"/>
-            <a:ext cx="35751960" cy="6957000"/>
-          </a:xfrm>
-          <a:prstGeom prst="rect">
-            <a:avLst/>
-          </a:prstGeom>
-        </p:spPr>
-        <p:txBody>
-          <a:bodyPr lIns="0" rIns="0" tIns="0" bIns="0" anchor="ctr"/>
-          <a:p>
-            <a:pPr algn="ctr"/>
-            <a:endParaRPr b="0" lang="en-US" sz="4400" spc="-1" strike="noStrike">
-              <a:solidFill>
-                <a:srgbClr val="000000"/>
-              </a:solidFill>
-              <a:uFill>
-                <a:solidFill>
-                  <a:srgbClr val="ffffff"/>
-                </a:solidFill>
-              </a:uFill>
-              <a:latin typeface="Arial"/>
-            </a:endParaRPr>
-          </a:p>
-        </p:txBody>
-      </p:sp>
-      <p:sp>
-        <p:nvSpPr>
-          <p:cNvPr id="2" name="PlaceHolder 2"/>
-          <p:cNvSpPr>
-            <a:spLocks noGrp="1"/>
-          </p:cNvSpPr>
-          <p:nvPr>
-            <p:ph type="body"/>
-          </p:nvPr>
-        </p:nvSpPr>
-        <p:spPr>
-          <a:xfrm>
-            <a:off x="2103120" y="7595640"/>
-            <a:ext cx="37855440" cy="18826560"/>
-          </a:xfrm>
-          <a:prstGeom prst="rect">
-            <a:avLst/>
-          </a:prstGeom>
-        </p:spPr>
-        <p:txBody>
-          <a:bodyPr lIns="0" rIns="0" tIns="0" bIns="0"/>
-          <a:p>
-            <a:pPr marL="432000" indent="-324000">
-              <a:buClr>
-                <a:srgbClr val="000000"/>
-              </a:buClr>
-              <a:buSzPct val="45000"/>
-              <a:buFont typeface="Wingdings" charset="2"/>
-              <a:buChar char=""/>
-            </a:pPr>
-            <a:r>
-              <a:rPr b="0" lang="en-US" sz="1800" spc="-1" strike="noStrike">
-                <a:solidFill>
-                  <a:srgbClr val="000000"/>
-                </a:solidFill>
-                <a:uFill>
-                  <a:solidFill>
-                    <a:srgbClr val="ffffff"/>
-                  </a:solidFill>
-                </a:uFill>
-                <a:latin typeface="Arial"/>
-              </a:rPr>
-              <a:t>Click to edit the outline text format</a:t>
-            </a:r>
-            <a:endParaRPr b="0" lang="en-US" sz="1800" spc="-1" strike="noStrike">
-              <a:solidFill>
-                <a:srgbClr val="000000"/>
-              </a:solidFill>
-              <a:uFill>
-                <a:solidFill>
-                  <a:srgbClr val="ffffff"/>
-                </a:solidFill>
-              </a:uFill>
-              <a:latin typeface="Arial"/>
-            </a:endParaRPr>
-          </a:p>
-          <a:p>
-            <a:pPr lvl="1" marL="864000" indent="-324000">
-              <a:buClr>
-                <a:srgbClr val="000000"/>
-              </a:buClr>
-              <a:buSzPct val="75000"/>
-              <a:buFont typeface="Symbol" charset="2"/>
-              <a:buChar char=""/>
-            </a:pPr>
-            <a:r>
-              <a:rPr b="0" lang="en-US" sz="1800" spc="-1" strike="noStrike">
-                <a:solidFill>
-                  <a:srgbClr val="000000"/>
-                </a:solidFill>
-                <a:uFill>
-                  <a:solidFill>
-                    <a:srgbClr val="ffffff"/>
-                  </a:solidFill>
-                </a:uFill>
-                <a:latin typeface="Arial"/>
-              </a:rPr>
-              <a:t>Second Outline Level</a:t>
-            </a:r>
-            <a:endParaRPr b="0" lang="en-US" sz="1800" spc="-1" strike="noStrike">
-              <a:solidFill>
-                <a:srgbClr val="000000"/>
-              </a:solidFill>
-              <a:uFill>
-                <a:solidFill>
-                  <a:srgbClr val="ffffff"/>
-                </a:solidFill>
-              </a:uFill>
-              <a:latin typeface="Arial"/>
-            </a:endParaRPr>
-          </a:p>
-          <a:p>
-            <a:pPr lvl="2" marL="1296000" indent="-288000">
-              <a:buClr>
-                <a:srgbClr val="000000"/>
-              </a:buClr>
-              <a:buSzPct val="45000"/>
-              <a:buFont typeface="Wingdings" charset="2"/>
-              <a:buChar char=""/>
-            </a:pPr>
-            <a:r>
-              <a:rPr b="0" lang="en-US" sz="1800" spc="-1" strike="noStrike">
-                <a:solidFill>
-                  <a:srgbClr val="000000"/>
-                </a:solidFill>
-                <a:uFill>
-                  <a:solidFill>
-                    <a:srgbClr val="ffffff"/>
-                  </a:solidFill>
-                </a:uFill>
-                <a:latin typeface="Arial"/>
-              </a:rPr>
-              <a:t>Third Outline Level</a:t>
-            </a:r>
-            <a:endParaRPr b="0" lang="en-US" sz="1800" spc="-1" strike="noStrike">
-              <a:solidFill>
-                <a:srgbClr val="000000"/>
-              </a:solidFill>
-              <a:uFill>
-                <a:solidFill>
-                  <a:srgbClr val="ffffff"/>
-                </a:solidFill>
-              </a:uFill>
-              <a:latin typeface="Arial"/>
-            </a:endParaRPr>
-          </a:p>
-          <a:p>
-            <a:pPr lvl="3" marL="1728000" indent="-216000">
-              <a:buClr>
-                <a:srgbClr val="000000"/>
-              </a:buClr>
-              <a:buSzPct val="75000"/>
-              <a:buFont typeface="Symbol" charset="2"/>
-              <a:buChar char=""/>
-            </a:pPr>
-            <a:r>
-              <a:rPr b="0" lang="en-US" sz="1800" spc="-1" strike="noStrike">
-                <a:solidFill>
-                  <a:srgbClr val="000000"/>
-                </a:solidFill>
-                <a:uFill>
-                  <a:solidFill>
-                    <a:srgbClr val="ffffff"/>
-                  </a:solidFill>
-                </a:uFill>
-                <a:latin typeface="Arial"/>
-              </a:rPr>
-              <a:t>Fourth Outline Level</a:t>
-            </a:r>
-            <a:endParaRPr b="0" lang="en-US" sz="1800" spc="-1" strike="noStrike">
-              <a:solidFill>
-                <a:srgbClr val="000000"/>
-              </a:solidFill>
-              <a:uFill>
-                <a:solidFill>
-                  <a:srgbClr val="ffffff"/>
-                </a:solidFill>
-              </a:uFill>
-              <a:latin typeface="Arial"/>
-            </a:endParaRPr>
-          </a:p>
-          <a:p>
-            <a:pPr lvl="4" marL="2160000" indent="-216000">
-              <a:buClr>
-                <a:srgbClr val="000000"/>
-              </a:buClr>
-              <a:buSzPct val="45000"/>
-              <a:buFont typeface="Wingdings" charset="2"/>
-              <a:buChar char=""/>
-            </a:pPr>
-            <a:r>
-              <a:rPr b="0" lang="en-US" sz="1800" spc="-1" strike="noStrike">
-                <a:solidFill>
-                  <a:srgbClr val="000000"/>
-                </a:solidFill>
-                <a:uFill>
-                  <a:solidFill>
-                    <a:srgbClr val="ffffff"/>
-                  </a:solidFill>
-                </a:uFill>
-                <a:latin typeface="Arial"/>
-              </a:rPr>
-              <a:t>Fifth Outline Level</a:t>
-            </a:r>
-            <a:endParaRPr b="0" lang="en-US" sz="1800" spc="-1" strike="noStrike">
-              <a:solidFill>
-                <a:srgbClr val="000000"/>
-              </a:solidFill>
-              <a:uFill>
-                <a:solidFill>
-                  <a:srgbClr val="ffffff"/>
-                </a:solidFill>
-              </a:uFill>
-              <a:latin typeface="Arial"/>
-            </a:endParaRPr>
-          </a:p>
-          <a:p>
-            <a:pPr lvl="5" marL="2592000" indent="-216000">
-              <a:buClr>
-                <a:srgbClr val="000000"/>
-              </a:buClr>
-              <a:buSzPct val="45000"/>
-              <a:buFont typeface="Wingdings" charset="2"/>
-              <a:buChar char=""/>
-            </a:pPr>
-            <a:r>
-              <a:rPr b="0" lang="en-US" sz="1800" spc="-1" strike="noStrike">
-                <a:solidFill>
-                  <a:srgbClr val="000000"/>
-                </a:solidFill>
-                <a:uFill>
-                  <a:solidFill>
-                    <a:srgbClr val="ffffff"/>
-                  </a:solidFill>
-                </a:uFill>
-                <a:latin typeface="Arial"/>
-              </a:rPr>
-              <a:t>Sixth Outline Level</a:t>
-            </a:r>
-            <a:endParaRPr b="0" lang="en-US" sz="1800" spc="-1" strike="noStrike">
-              <a:solidFill>
-                <a:srgbClr val="000000"/>
-              </a:solidFill>
-              <a:uFill>
-                <a:solidFill>
-                  <a:srgbClr val="ffffff"/>
-                </a:solidFill>
-              </a:uFill>
-              <a:latin typeface="Arial"/>
-            </a:endParaRPr>
-          </a:p>
-          <a:p>
-            <a:pPr lvl="6" marL="3024000" indent="-216000">
-              <a:buClr>
-                <a:srgbClr val="000000"/>
-              </a:buClr>
-              <a:buSzPct val="45000"/>
-              <a:buFont typeface="Wingdings" charset="2"/>
-              <a:buChar char=""/>
-            </a:pPr>
-            <a:r>
-              <a:rPr b="0" lang="en-US" sz="1800" spc="-1" strike="noStrike">
-                <a:solidFill>
-                  <a:srgbClr val="000000"/>
-                </a:solidFill>
-                <a:uFill>
-                  <a:solidFill>
-                    <a:srgbClr val="ffffff"/>
-                  </a:solidFill>
-                </a:uFill>
-                <a:latin typeface="Arial"/>
-              </a:rPr>
-              <a:t>Seventh Outline Level</a:t>
-            </a:r>
-            <a:endParaRPr b="0" lang="en-US" sz="1800" spc="-1" strike="noStrike">
-              <a:solidFill>
-                <a:srgbClr val="000000"/>
-              </a:solidFill>
-              <a:uFill>
-                <a:solidFill>
-                  <a:srgbClr val="ffffff"/>
-                </a:solidFill>
-              </a:uFill>
-              <a:latin typeface="Arial"/>
-            </a:endParaRPr>
-          </a:p>
-        </p:txBody>
-      </p:sp>
     </p:spTree>
   </p:cSld>
   <p:clrMap bg1="lt1" bg2="lt2" tx1="dk1" tx2="dk2" accent1="accent1" accent2="accent2" accent3="accent3" accent4="accent4" accent5="accent5" accent6="accent6" hlink="hlink" folHlink="folHlink"/>
@@ -2275,14 +1970,14 @@
       </p:grpSpPr>
       <p:sp>
         <p:nvSpPr>
-          <p:cNvPr id="42" name="CustomShape 1"/>
+          <p:cNvPr id="40" name="CustomShape 1"/>
           <p:cNvSpPr/>
           <p:nvPr/>
         </p:nvSpPr>
         <p:spPr>
           <a:xfrm>
             <a:off x="11545560" y="2503080"/>
-            <a:ext cx="18950760" cy="1364760"/>
+            <a:ext cx="18950400" cy="1364400"/>
           </a:xfrm>
           <a:prstGeom prst="rect">
             <a:avLst/>
@@ -2337,14 +2032,14 @@
       </p:sp>
       <p:sp>
         <p:nvSpPr>
-          <p:cNvPr id="43" name="CustomShape 2"/>
+          <p:cNvPr id="41" name="CustomShape 2"/>
           <p:cNvSpPr/>
           <p:nvPr/>
         </p:nvSpPr>
         <p:spPr>
           <a:xfrm>
             <a:off x="11545560" y="3868920"/>
-            <a:ext cx="18950760" cy="1990440"/>
+            <a:ext cx="18950400" cy="1990080"/>
           </a:xfrm>
           <a:prstGeom prst="rect">
             <a:avLst/>
@@ -2399,14 +2094,14 @@
       </p:sp>
       <p:sp>
         <p:nvSpPr>
-          <p:cNvPr id="44" name="CustomShape 3"/>
+          <p:cNvPr id="42" name="CustomShape 3"/>
           <p:cNvSpPr/>
           <p:nvPr/>
         </p:nvSpPr>
         <p:spPr>
           <a:xfrm>
             <a:off x="11521440" y="13533120"/>
-            <a:ext cx="9221400" cy="20170440"/>
+            <a:ext cx="9221040" cy="20170080"/>
           </a:xfrm>
           <a:prstGeom prst="rect">
             <a:avLst/>
@@ -2527,14 +2222,14 @@
       </p:sp>
       <p:sp>
         <p:nvSpPr>
-          <p:cNvPr id="45" name="CustomShape 4"/>
+          <p:cNvPr id="43" name="CustomShape 4"/>
           <p:cNvSpPr/>
           <p:nvPr/>
         </p:nvSpPr>
         <p:spPr>
           <a:xfrm>
             <a:off x="21305520" y="5486400"/>
-            <a:ext cx="9221400" cy="19439280"/>
+            <a:ext cx="9221040" cy="19438920"/>
           </a:xfrm>
           <a:prstGeom prst="rect">
             <a:avLst/>
@@ -2586,7 +2281,7 @@
             </a:endParaRPr>
           </a:p>
           <a:p>
-            <a:pPr marL="457200" indent="-456120">
+            <a:pPr marL="457200" indent="-455760">
               <a:lnSpc>
                 <a:spcPct val="100000"/>
               </a:lnSpc>
@@ -2609,22 +2304,22 @@
                 <a:latin typeface="Trebuchet MS"/>
                 <a:ea typeface="DejaVu Sans"/>
               </a:rPr>
-              <a:t>Reenforcement Learning Using the Keras Library</a:t>
-            </a:r>
-            <a:endParaRPr b="0" lang="en-US" sz="1800" spc="-1" strike="noStrike">
-              <a:solidFill>
-                <a:srgbClr val="000000"/>
-              </a:solidFill>
-              <a:uFill>
-                <a:solidFill>
-                  <a:srgbClr val="ffffff"/>
-                </a:solidFill>
-              </a:uFill>
-              <a:latin typeface="Arial"/>
-            </a:endParaRPr>
-          </a:p>
-          <a:p>
-            <a:pPr marL="457200" indent="-456120">
+              <a:t>Reinforcement Learning Using the Keras Library</a:t>
+            </a:r>
+            <a:endParaRPr b="0" lang="en-US" sz="1800" spc="-1" strike="noStrike">
+              <a:solidFill>
+                <a:srgbClr val="000000"/>
+              </a:solidFill>
+              <a:uFill>
+                <a:solidFill>
+                  <a:srgbClr val="ffffff"/>
+                </a:solidFill>
+              </a:uFill>
+              <a:latin typeface="Arial"/>
+            </a:endParaRPr>
+          </a:p>
+          <a:p>
+            <a:pPr marL="457200" indent="-455760">
               <a:lnSpc>
                 <a:spcPct val="100000"/>
               </a:lnSpc>
@@ -2662,7 +2357,7 @@
             </a:endParaRPr>
           </a:p>
           <a:p>
-            <a:pPr marL="457200" indent="-456120">
+            <a:pPr marL="457200" indent="-455760">
               <a:lnSpc>
                 <a:spcPct val="100000"/>
               </a:lnSpc>
@@ -2700,7 +2395,7 @@
             </a:endParaRPr>
           </a:p>
           <a:p>
-            <a:pPr marL="457200" indent="-456120">
+            <a:pPr marL="457200" indent="-455760">
               <a:lnSpc>
                 <a:spcPct val="100000"/>
               </a:lnSpc>
@@ -2738,7 +2433,7 @@
             </a:endParaRPr>
           </a:p>
           <a:p>
-            <a:pPr marL="457200" indent="-456120">
+            <a:pPr marL="457200" indent="-455760">
               <a:lnSpc>
                 <a:spcPct val="100000"/>
               </a:lnSpc>
@@ -2776,7 +2471,7 @@
             </a:endParaRPr>
           </a:p>
           <a:p>
-            <a:pPr marL="457200" indent="-456120">
+            <a:pPr marL="457200" indent="-455760">
               <a:lnSpc>
                 <a:spcPct val="100000"/>
               </a:lnSpc>
@@ -2814,7 +2509,7 @@
             </a:endParaRPr>
           </a:p>
           <a:p>
-            <a:pPr marL="457200" indent="-456120">
+            <a:pPr marL="457200" indent="-455760">
               <a:lnSpc>
                 <a:spcPct val="100000"/>
               </a:lnSpc>
@@ -2852,7 +2547,7 @@
             </a:endParaRPr>
           </a:p>
           <a:p>
-            <a:pPr marL="457200" indent="-456120">
+            <a:pPr marL="457200" indent="-455760">
               <a:lnSpc>
                 <a:spcPct val="100000"/>
               </a:lnSpc>
@@ -2875,22 +2570,22 @@
                 <a:latin typeface="Trebuchet MS"/>
                 <a:ea typeface="DejaVu Sans"/>
               </a:rPr>
-              <a:t>Sores Batch Data in sqlite3 database</a:t>
-            </a:r>
-            <a:endParaRPr b="0" lang="en-US" sz="1800" spc="-1" strike="noStrike">
-              <a:solidFill>
-                <a:srgbClr val="000000"/>
-              </a:solidFill>
-              <a:uFill>
-                <a:solidFill>
-                  <a:srgbClr val="ffffff"/>
-                </a:solidFill>
-              </a:uFill>
-              <a:latin typeface="Arial"/>
-            </a:endParaRPr>
-          </a:p>
-          <a:p>
-            <a:pPr marL="457200" indent="-456120">
+              <a:t>Stores Batch Data in sqlite3 database</a:t>
+            </a:r>
+            <a:endParaRPr b="0" lang="en-US" sz="1800" spc="-1" strike="noStrike">
+              <a:solidFill>
+                <a:srgbClr val="000000"/>
+              </a:solidFill>
+              <a:uFill>
+                <a:solidFill>
+                  <a:srgbClr val="ffffff"/>
+                </a:solidFill>
+              </a:uFill>
+              <a:latin typeface="Arial"/>
+            </a:endParaRPr>
+          </a:p>
+          <a:p>
+            <a:pPr marL="457200" indent="-455760">
               <a:lnSpc>
                 <a:spcPct val="100000"/>
               </a:lnSpc>
@@ -2928,44 +2623,6 @@
             </a:endParaRPr>
           </a:p>
           <a:p>
-            <a:pPr marL="457200" indent="-456120">
-              <a:lnSpc>
-                <a:spcPct val="100000"/>
-              </a:lnSpc>
-              <a:buClr>
-                <a:srgbClr val="000000"/>
-              </a:buClr>
-              <a:buFont typeface="Arial"/>
-              <a:buChar char="•"/>
-            </a:pPr>
-            <a:r>
-              <a:rPr b="0" lang="en-US" sz="4400" spc="-1" strike="noStrike">
-                <a:solidFill>
-                  <a:srgbClr val="000000"/>
-                </a:solidFill>
-                <a:uFill>
-                  <a:solidFill>
-                    <a:srgbClr val="ffffff"/>
-                  </a:solidFill>
-                </a:uFill>
-                <a:latin typeface="Trebuchet MS"/>
-                <a:ea typeface="DejaVu Sans"/>
-              </a:rPr>
-              <a:t> </a:t>
-            </a:r>
-            <a:endParaRPr b="0" lang="en-US" sz="1800" spc="-1" strike="noStrike">
-              <a:solidFill>
-                <a:srgbClr val="000000"/>
-              </a:solidFill>
-              <a:uFill>
-                <a:solidFill>
-                  <a:srgbClr val="ffffff"/>
-                </a:solidFill>
-              </a:uFill>
-              <a:latin typeface="Arial"/>
-            </a:endParaRPr>
-          </a:p>
-          <a:p>
             <a:pPr>
               <a:lnSpc>
                 <a:spcPct val="100000"/>
@@ -3005,14 +2662,14 @@
       </p:sp>
       <p:sp>
         <p:nvSpPr>
-          <p:cNvPr id="46" name="CustomShape 5"/>
+          <p:cNvPr id="44" name="CustomShape 5"/>
           <p:cNvSpPr/>
           <p:nvPr/>
         </p:nvSpPr>
         <p:spPr>
           <a:xfrm>
             <a:off x="970200" y="4330800"/>
-            <a:ext cx="8562240" cy="27032400"/>
+            <a:ext cx="8561880" cy="27032040"/>
           </a:xfrm>
           <a:prstGeom prst="rect">
             <a:avLst/>
@@ -3097,7 +2754,7 @@
             </a:endParaRPr>
           </a:p>
           <a:p>
-            <a:pPr marL="216000" indent="-215640">
+            <a:pPr marL="216000" indent="-215280">
               <a:lnSpc>
                 <a:spcPct val="100000"/>
               </a:lnSpc>
@@ -3150,7 +2807,7 @@
             </a:endParaRPr>
           </a:p>
           <a:p>
-            <a:pPr marL="216000" indent="-215640">
+            <a:pPr marL="216000" indent="-215280">
               <a:lnSpc>
                 <a:spcPct val="100000"/>
               </a:lnSpc>
@@ -3203,7 +2860,7 @@
             </a:endParaRPr>
           </a:p>
           <a:p>
-            <a:pPr marL="216000" indent="-215640">
+            <a:pPr marL="216000" indent="-215280">
               <a:lnSpc>
                 <a:spcPct val="100000"/>
               </a:lnSpc>
@@ -3682,7 +3339,7 @@
             </a:endParaRPr>
           </a:p>
           <a:p>
-            <a:pPr marL="216000" indent="-215640">
+            <a:pPr marL="216000" indent="-215280">
               <a:lnSpc>
                 <a:spcPct val="100000"/>
               </a:lnSpc>
@@ -3735,7 +3392,7 @@
             </a:endParaRPr>
           </a:p>
           <a:p>
-            <a:pPr marL="216000" indent="-215640">
+            <a:pPr marL="216000" indent="-215280">
               <a:lnSpc>
                 <a:spcPct val="100000"/>
               </a:lnSpc>
@@ -3788,7 +3445,7 @@
             </a:endParaRPr>
           </a:p>
           <a:p>
-            <a:pPr marL="216000" indent="-215640">
+            <a:pPr marL="216000" indent="-215280">
               <a:lnSpc>
                 <a:spcPct val="100000"/>
               </a:lnSpc>
@@ -3895,14 +3552,14 @@
       </p:sp>
       <p:sp>
         <p:nvSpPr>
-          <p:cNvPr id="47" name="CustomShape 6"/>
+          <p:cNvPr id="45" name="CustomShape 6"/>
           <p:cNvSpPr/>
           <p:nvPr/>
         </p:nvSpPr>
         <p:spPr>
           <a:xfrm>
             <a:off x="982800" y="2820960"/>
-            <a:ext cx="8549640" cy="2103120"/>
+            <a:ext cx="8549280" cy="2102760"/>
           </a:xfrm>
           <a:prstGeom prst="rect">
             <a:avLst/>
@@ -3957,14 +3614,14 @@
       </p:sp>
       <p:sp>
         <p:nvSpPr>
-          <p:cNvPr id="48" name="CustomShape 7"/>
+          <p:cNvPr id="46" name="CustomShape 7"/>
           <p:cNvSpPr/>
           <p:nvPr/>
         </p:nvSpPr>
         <p:spPr>
           <a:xfrm>
             <a:off x="32527800" y="14371560"/>
-            <a:ext cx="8551440" cy="2145600"/>
+            <a:ext cx="8551080" cy="2145240"/>
           </a:xfrm>
           <a:prstGeom prst="rect">
             <a:avLst/>
@@ -3983,14 +3640,14 @@
       </p:sp>
       <p:sp>
         <p:nvSpPr>
-          <p:cNvPr id="49" name="CustomShape 8"/>
+          <p:cNvPr id="47" name="CustomShape 8"/>
           <p:cNvSpPr/>
           <p:nvPr/>
         </p:nvSpPr>
         <p:spPr>
           <a:xfrm>
             <a:off x="32527800" y="14904720"/>
-            <a:ext cx="8551440" cy="10090440"/>
+            <a:ext cx="8551080" cy="10090080"/>
           </a:xfrm>
           <a:prstGeom prst="rect">
             <a:avLst/>
@@ -4042,7 +3699,7 @@
             </a:endParaRPr>
           </a:p>
           <a:p>
-            <a:pPr marL="457200" indent="-456120">
+            <a:pPr marL="457200" indent="-455760">
               <a:lnSpc>
                 <a:spcPct val="100000"/>
               </a:lnSpc>
@@ -4080,7 +3737,7 @@
             </a:endParaRPr>
           </a:p>
           <a:p>
-            <a:pPr marL="457200" indent="-456120">
+            <a:pPr marL="457200" indent="-455760">
               <a:lnSpc>
                 <a:spcPct val="100000"/>
               </a:lnSpc>
@@ -4118,7 +3775,7 @@
             </a:endParaRPr>
           </a:p>
           <a:p>
-            <a:pPr marL="457200" indent="-456120">
+            <a:pPr marL="457200" indent="-455760">
               <a:lnSpc>
                 <a:spcPct val="100000"/>
               </a:lnSpc>
@@ -4156,7 +3813,7 @@
             </a:endParaRPr>
           </a:p>
           <a:p>
-            <a:pPr marL="457200" indent="-456120">
+            <a:pPr marL="457200" indent="-455760">
               <a:lnSpc>
                 <a:spcPct val="100000"/>
               </a:lnSpc>
@@ -4215,14 +3872,14 @@
       </p:sp>
       <p:sp>
         <p:nvSpPr>
-          <p:cNvPr id="50" name="CustomShape 9"/>
+          <p:cNvPr id="48" name="CustomShape 9"/>
           <p:cNvSpPr/>
           <p:nvPr/>
         </p:nvSpPr>
         <p:spPr>
           <a:xfrm>
             <a:off x="11260440" y="5221440"/>
-            <a:ext cx="9221400" cy="7579440"/>
+            <a:ext cx="9221040" cy="7579080"/>
           </a:xfrm>
           <a:prstGeom prst="rect">
             <a:avLst/>
@@ -4290,14 +3947,14 @@
       </p:sp>
       <p:sp>
         <p:nvSpPr>
-          <p:cNvPr id="51" name="CustomShape 10"/>
+          <p:cNvPr id="49" name="CustomShape 10"/>
           <p:cNvSpPr/>
           <p:nvPr/>
         </p:nvSpPr>
         <p:spPr>
           <a:xfrm>
             <a:off x="21227400" y="22503600"/>
-            <a:ext cx="9221400" cy="7579440"/>
+            <a:ext cx="9221040" cy="7579080"/>
           </a:xfrm>
           <a:prstGeom prst="rect">
             <a:avLst/>
@@ -4365,14 +4022,14 @@
       </p:sp>
       <p:sp>
         <p:nvSpPr>
-          <p:cNvPr id="52" name="CustomShape 11"/>
+          <p:cNvPr id="50" name="CustomShape 11"/>
           <p:cNvSpPr/>
           <p:nvPr/>
         </p:nvSpPr>
         <p:spPr>
           <a:xfrm>
             <a:off x="32735520" y="3200400"/>
-            <a:ext cx="8228880" cy="10240560"/>
+            <a:ext cx="8228520" cy="10240200"/>
           </a:xfrm>
           <a:prstGeom prst="rect">
             <a:avLst/>
@@ -4395,14 +4052,14 @@
       </p:sp>
       <p:sp>
         <p:nvSpPr>
-          <p:cNvPr id="53" name="CustomShape 12"/>
+          <p:cNvPr id="51" name="CustomShape 12"/>
           <p:cNvSpPr/>
           <p:nvPr/>
         </p:nvSpPr>
         <p:spPr>
           <a:xfrm>
             <a:off x="33320160" y="7955280"/>
-            <a:ext cx="7223040" cy="5208840"/>
+            <a:ext cx="7222680" cy="5208480"/>
           </a:xfrm>
           <a:prstGeom prst="rect">
             <a:avLst/>
@@ -4730,14 +4387,14 @@
       </p:sp>
       <p:sp>
         <p:nvSpPr>
-          <p:cNvPr id="54" name="CustomShape 13"/>
+          <p:cNvPr id="52" name="CustomShape 13"/>
           <p:cNvSpPr/>
           <p:nvPr/>
         </p:nvSpPr>
         <p:spPr>
           <a:xfrm>
             <a:off x="33375600" y="5088240"/>
-            <a:ext cx="6948720" cy="854640"/>
+            <a:ext cx="6948360" cy="854280"/>
           </a:xfrm>
           <a:prstGeom prst="rect">
             <a:avLst/>
@@ -4787,7 +4444,7 @@
       </p:sp>
       <p:pic>
         <p:nvPicPr>
-          <p:cNvPr id="55" name="" descr=""/>
+          <p:cNvPr id="53" name="" descr=""/>
           <p:cNvPicPr/>
           <p:nvPr/>
         </p:nvPicPr>
@@ -4798,7 +4455,7 @@
         <p:spPr>
           <a:xfrm>
             <a:off x="279000" y="10515600"/>
-            <a:ext cx="10236240" cy="7680600"/>
+            <a:ext cx="10235880" cy="7680240"/>
           </a:xfrm>
           <a:prstGeom prst="rect">
             <a:avLst/>
@@ -4810,14 +4467,14 @@
       </p:pic>
       <p:sp>
         <p:nvSpPr>
-          <p:cNvPr id="56" name="CustomShape 14"/>
+          <p:cNvPr id="54" name="CustomShape 14"/>
           <p:cNvSpPr/>
           <p:nvPr/>
         </p:nvSpPr>
         <p:spPr>
           <a:xfrm>
             <a:off x="1005840" y="18430920"/>
-            <a:ext cx="8777880" cy="1228320"/>
+            <a:ext cx="8777520" cy="1227960"/>
           </a:xfrm>
           <a:prstGeom prst="rect">
             <a:avLst/>
@@ -4847,6 +4504,7 @@
                   </a:solidFill>
                 </a:uFill>
                 <a:latin typeface="Nimbus Sans"/>
+                <a:ea typeface="DejaVu Sans"/>
               </a:rPr>
               <a:t>Figure 1: A flowchart providing a high-level description on how the user feedback is incorporated into the decision-making process.</a:t>
             </a:r>

</xml_diff>